<commit_message>
Atualizando documentos e criação dos slides
</commit_message>
<xml_diff>
--- a/material_de_apoio/resumo_pratico.pptx
+++ b/material_de_apoio/resumo_pratico.pptx
@@ -105,6 +105,11 @@
       </a:defRPr>
     </a:lvl9pPr>
   </p:defaultTextStyle>
+  <p:extLst>
+    <p:ext uri="{EFAFB233-063F-42B5-8137-9DF3F51BA10A}">
+      <p15:sldGuideLst xmlns:p15="http://schemas.microsoft.com/office/powerpoint/2012/main"/>
+    </p:ext>
+  </p:extLst>
 </p:presentation>
 </file>
 
@@ -3162,29 +3167,20 @@
         </p:nvSpPr>
         <p:spPr/>
         <p:txBody>
-          <a:bodyPr/>
-          <a:lstStyle/>
-          <a:p>
-            <a:endParaRPr lang="pt-BR" dirty="0"/>
-          </a:p>
-        </p:txBody>
-      </p:sp>
-      <p:sp>
-        <p:nvSpPr>
-          <p:cNvPr id="3" name="Espaço Reservado para Conteúdo 2"/>
-          <p:cNvSpPr>
-            <a:spLocks noGrp="1"/>
-          </p:cNvSpPr>
-          <p:nvPr>
-            <p:ph idx="1"/>
-          </p:nvPr>
-        </p:nvSpPr>
-        <p:spPr/>
-        <p:txBody>
-          <a:bodyPr/>
-          <a:lstStyle/>
-          <a:p>
-            <a:endParaRPr lang="pt-BR" dirty="0"/>
+          <a:bodyPr>
+            <a:normAutofit/>
+          </a:bodyPr>
+          <a:lstStyle/>
+          <a:p>
+            <a:r>
+              <a:rPr lang="pt-BR" sz="3200" dirty="0" smtClean="0">
+                <a:latin typeface="Consolas" panose="020B0609020204030204" pitchFamily="49" charset="0"/>
+              </a:rPr>
+              <a:t>O programa mais simples em Java</a:t>
+            </a:r>
+            <a:endParaRPr lang="pt-BR" sz="3200" dirty="0">
+              <a:latin typeface="Consolas" panose="020B0609020204030204" pitchFamily="49" charset="0"/>
+            </a:endParaRPr>
           </a:p>
         </p:txBody>
       </p:sp>
@@ -3212,6 +3208,36 @@
           <a:xfrm>
             <a:off x="10441211" y="110689"/>
             <a:ext cx="1750789" cy="2157949"/>
+          </a:xfrm>
+          <a:prstGeom prst="rect">
+            <a:avLst/>
+          </a:prstGeom>
+        </p:spPr>
+      </p:pic>
+      <p:pic>
+        <p:nvPicPr>
+          <p:cNvPr id="5" name="Imagem 4"/>
+          <p:cNvPicPr>
+            <a:picLocks noChangeAspect="1"/>
+          </p:cNvPicPr>
+          <p:nvPr/>
+        </p:nvPicPr>
+        <p:blipFill>
+          <a:blip r:embed="rId3">
+            <a:extLst>
+              <a:ext uri="{28A0092B-C50C-407E-A947-70E740481C1C}">
+                <a14:useLocalDpi xmlns:a14="http://schemas.microsoft.com/office/drawing/2010/main" val="0"/>
+              </a:ext>
+            </a:extLst>
+          </a:blip>
+          <a:stretch>
+            <a:fillRect/>
+          </a:stretch>
+        </p:blipFill>
+        <p:spPr>
+          <a:xfrm>
+            <a:off x="0" y="2688631"/>
+            <a:ext cx="12192000" cy="3221401"/>
           </a:xfrm>
           <a:prstGeom prst="rect">
             <a:avLst/>

</xml_diff>

<commit_message>
Atualizando explicações nos slides
</commit_message>
<xml_diff>
--- a/material_de_apoio/resumo_pratico.pptx
+++ b/material_de_apoio/resumo_pratico.pptx
@@ -5,7 +5,7 @@
     <p:sldMasterId id="2147483660" r:id="rId1"/>
   </p:sldMasterIdLst>
   <p:notesMasterIdLst>
-    <p:notesMasterId r:id="rId43"/>
+    <p:notesMasterId r:id="rId57"/>
   </p:notesMasterIdLst>
   <p:sldIdLst>
     <p:sldId id="256" r:id="rId2"/>
@@ -49,6 +49,20 @@
     <p:sldId id="294" r:id="rId40"/>
     <p:sldId id="295" r:id="rId41"/>
     <p:sldId id="296" r:id="rId42"/>
+    <p:sldId id="297" r:id="rId43"/>
+    <p:sldId id="298" r:id="rId44"/>
+    <p:sldId id="299" r:id="rId45"/>
+    <p:sldId id="300" r:id="rId46"/>
+    <p:sldId id="301" r:id="rId47"/>
+    <p:sldId id="302" r:id="rId48"/>
+    <p:sldId id="303" r:id="rId49"/>
+    <p:sldId id="304" r:id="rId50"/>
+    <p:sldId id="305" r:id="rId51"/>
+    <p:sldId id="306" r:id="rId52"/>
+    <p:sldId id="307" r:id="rId53"/>
+    <p:sldId id="308" r:id="rId54"/>
+    <p:sldId id="309" r:id="rId55"/>
+    <p:sldId id="310" r:id="rId56"/>
   </p:sldIdLst>
   <p:sldSz cx="12192000" cy="6858000"/>
   <p:notesSz cx="6858000" cy="9144000"/>
@@ -21119,7 +21133,7 @@
           </a:prstGeom>
           <a:ln w="38100">
             <a:solidFill>
-              <a:schemeClr val="tx1"/>
+              <a:srgbClr val="00FF00"/>
             </a:solidFill>
             <a:tailEnd type="triangle"/>
           </a:ln>
@@ -21164,11 +21178,17 @@
             <a:pPr algn="ctr"/>
             <a:r>
               <a:rPr lang="pt-BR" sz="2800" b="1" dirty="0" err="1" smtClean="0">
+                <a:solidFill>
+                  <a:srgbClr val="00FF00"/>
+                </a:solidFill>
                 <a:latin typeface="Consolas" panose="020B0609020204030204" pitchFamily="49" charset="0"/>
               </a:rPr>
               <a:t>true</a:t>
             </a:r>
             <a:endParaRPr lang="pt-BR" sz="2800" b="1" dirty="0">
+              <a:solidFill>
+                <a:srgbClr val="00FF00"/>
+              </a:solidFill>
               <a:latin typeface="Consolas" panose="020B0609020204030204" pitchFamily="49" charset="0"/>
             </a:endParaRPr>
           </a:p>
@@ -22715,7 +22735,7 @@
           </a:prstGeom>
           <a:ln w="38100">
             <a:solidFill>
-              <a:schemeClr val="tx1"/>
+              <a:srgbClr val="00FF00"/>
             </a:solidFill>
             <a:tailEnd type="triangle"/>
           </a:ln>
@@ -22760,11 +22780,17 @@
             <a:pPr algn="ctr"/>
             <a:r>
               <a:rPr lang="pt-BR" sz="2800" b="1" dirty="0" err="1" smtClean="0">
+                <a:solidFill>
+                  <a:srgbClr val="00FF00"/>
+                </a:solidFill>
                 <a:latin typeface="Consolas" panose="020B0609020204030204" pitchFamily="49" charset="0"/>
               </a:rPr>
               <a:t>true</a:t>
             </a:r>
             <a:endParaRPr lang="pt-BR" sz="2800" b="1" dirty="0">
+              <a:solidFill>
+                <a:srgbClr val="00FF00"/>
+              </a:solidFill>
               <a:latin typeface="Consolas" panose="020B0609020204030204" pitchFamily="49" charset="0"/>
             </a:endParaRPr>
           </a:p>
@@ -24212,7 +24238,7 @@
           </a:prstGeom>
           <a:ln w="38100">
             <a:solidFill>
-              <a:schemeClr val="tx1"/>
+              <a:srgbClr val="00FF00"/>
             </a:solidFill>
             <a:tailEnd type="triangle"/>
           </a:ln>
@@ -24257,11 +24283,17 @@
             <a:pPr algn="ctr"/>
             <a:r>
               <a:rPr lang="pt-BR" sz="2800" b="1" dirty="0" err="1" smtClean="0">
+                <a:solidFill>
+                  <a:srgbClr val="00FF00"/>
+                </a:solidFill>
                 <a:latin typeface="Consolas" panose="020B0609020204030204" pitchFamily="49" charset="0"/>
               </a:rPr>
               <a:t>true</a:t>
             </a:r>
             <a:endParaRPr lang="pt-BR" sz="2800" b="1" dirty="0">
+              <a:solidFill>
+                <a:srgbClr val="00FF00"/>
+              </a:solidFill>
               <a:latin typeface="Consolas" panose="020B0609020204030204" pitchFamily="49" charset="0"/>
             </a:endParaRPr>
           </a:p>
@@ -25733,7 +25765,7 @@
           </a:prstGeom>
           <a:ln w="38100">
             <a:solidFill>
-              <a:schemeClr val="tx1"/>
+              <a:srgbClr val="FF0000"/>
             </a:solidFill>
             <a:tailEnd type="triangle"/>
           </a:ln>
@@ -25778,11 +25810,17 @@
             <a:pPr algn="ctr"/>
             <a:r>
               <a:rPr lang="pt-BR" sz="2800" b="1" dirty="0" smtClean="0">
+                <a:solidFill>
+                  <a:srgbClr val="FF0000"/>
+                </a:solidFill>
                 <a:latin typeface="Consolas" panose="020B0609020204030204" pitchFamily="49" charset="0"/>
               </a:rPr>
               <a:t>false</a:t>
             </a:r>
             <a:endParaRPr lang="pt-BR" sz="2800" b="1" dirty="0">
+              <a:solidFill>
+                <a:srgbClr val="FF0000"/>
+              </a:solidFill>
               <a:latin typeface="Consolas" panose="020B0609020204030204" pitchFamily="49" charset="0"/>
             </a:endParaRPr>
           </a:p>
@@ -30153,6 +30191,2803 @@
 </p:sld>
 </file>
 
+<file path=ppt/slides/slide42.xml><?xml version="1.0" encoding="utf-8"?>
+<p:sld xmlns:a="http://schemas.openxmlformats.org/drawingml/2006/main" xmlns:r="http://schemas.openxmlformats.org/officeDocument/2006/relationships" xmlns:p="http://schemas.openxmlformats.org/presentationml/2006/main">
+  <p:cSld>
+    <p:spTree>
+      <p:nvGrpSpPr>
+        <p:cNvPr id="1" name=""/>
+        <p:cNvGrpSpPr/>
+        <p:nvPr/>
+      </p:nvGrpSpPr>
+      <p:grpSpPr>
+        <a:xfrm>
+          <a:off x="0" y="0"/>
+          <a:ext cx="0" cy="0"/>
+          <a:chOff x="0" y="0"/>
+          <a:chExt cx="0" cy="0"/>
+        </a:xfrm>
+      </p:grpSpPr>
+      <p:pic>
+        <p:nvPicPr>
+          <p:cNvPr id="8" name="Imagem 7"/>
+          <p:cNvPicPr>
+            <a:picLocks noChangeAspect="1"/>
+          </p:cNvPicPr>
+          <p:nvPr/>
+        </p:nvPicPr>
+        <p:blipFill>
+          <a:blip r:embed="rId2"/>
+          <a:stretch>
+            <a:fillRect/>
+          </a:stretch>
+        </p:blipFill>
+        <p:spPr>
+          <a:xfrm>
+            <a:off x="480725" y="2803023"/>
+            <a:ext cx="10609524" cy="2800000"/>
+          </a:xfrm>
+          <a:prstGeom prst="rect">
+            <a:avLst/>
+          </a:prstGeom>
+        </p:spPr>
+      </p:pic>
+      <p:sp>
+        <p:nvSpPr>
+          <p:cNvPr id="2" name="Título 1"/>
+          <p:cNvSpPr>
+            <a:spLocks noGrp="1"/>
+          </p:cNvSpPr>
+          <p:nvPr>
+            <p:ph type="title"/>
+          </p:nvPr>
+        </p:nvSpPr>
+        <p:spPr>
+          <a:xfrm>
+            <a:off x="480725" y="385591"/>
+            <a:ext cx="7914128" cy="685753"/>
+          </a:xfrm>
+        </p:spPr>
+        <p:txBody>
+          <a:bodyPr>
+            <a:normAutofit/>
+          </a:bodyPr>
+          <a:lstStyle/>
+          <a:p>
+            <a:r>
+              <a:rPr lang="pt-BR" sz="3200" dirty="0" smtClean="0">
+                <a:latin typeface="Consolas" panose="020B0609020204030204" pitchFamily="49" charset="0"/>
+              </a:rPr>
+              <a:t>Estrutura de repetição For</a:t>
+            </a:r>
+            <a:endParaRPr lang="pt-BR" sz="3200" dirty="0">
+              <a:latin typeface="Consolas" panose="020B0609020204030204" pitchFamily="49" charset="0"/>
+            </a:endParaRPr>
+          </a:p>
+        </p:txBody>
+      </p:sp>
+      <p:pic>
+        <p:nvPicPr>
+          <p:cNvPr id="4" name="Imagem 3"/>
+          <p:cNvPicPr>
+            <a:picLocks noChangeAspect="1"/>
+          </p:cNvPicPr>
+          <p:nvPr/>
+        </p:nvPicPr>
+        <p:blipFill>
+          <a:blip r:embed="rId3" cstate="print">
+            <a:extLst>
+              <a:ext uri="{28A0092B-C50C-407E-A947-70E740481C1C}">
+                <a14:useLocalDpi xmlns:a14="http://schemas.microsoft.com/office/drawing/2010/main" val="0"/>
+              </a:ext>
+            </a:extLst>
+          </a:blip>
+          <a:stretch>
+            <a:fillRect/>
+          </a:stretch>
+        </p:blipFill>
+        <p:spPr>
+          <a:xfrm>
+            <a:off x="10441211" y="110689"/>
+            <a:ext cx="1750789" cy="2157949"/>
+          </a:xfrm>
+          <a:prstGeom prst="rect">
+            <a:avLst/>
+          </a:prstGeom>
+        </p:spPr>
+      </p:pic>
+      <p:sp>
+        <p:nvSpPr>
+          <p:cNvPr id="5" name="CaixaDeTexto 4"/>
+          <p:cNvSpPr txBox="1"/>
+          <p:nvPr/>
+        </p:nvSpPr>
+        <p:spPr>
+          <a:xfrm>
+            <a:off x="1130264" y="1499324"/>
+            <a:ext cx="3631777" cy="461665"/>
+          </a:xfrm>
+          <a:prstGeom prst="rect">
+            <a:avLst/>
+          </a:prstGeom>
+          <a:noFill/>
+        </p:spPr>
+        <p:txBody>
+          <a:bodyPr wrap="square" rtlCol="0">
+            <a:spAutoFit/>
+          </a:bodyPr>
+          <a:lstStyle/>
+          <a:p>
+            <a:r>
+              <a:rPr lang="pt-BR" sz="2400" b="1" dirty="0" smtClean="0">
+                <a:latin typeface="Consolas" panose="020B0609020204030204" pitchFamily="49" charset="0"/>
+              </a:rPr>
+              <a:t>i inicia igual a 0</a:t>
+            </a:r>
+            <a:endParaRPr lang="pt-BR" sz="2400" b="1" dirty="0">
+              <a:latin typeface="Consolas" panose="020B0609020204030204" pitchFamily="49" charset="0"/>
+            </a:endParaRPr>
+          </a:p>
+        </p:txBody>
+      </p:sp>
+      <p:cxnSp>
+        <p:nvCxnSpPr>
+          <p:cNvPr id="6" name="Conector de seta reta 5"/>
+          <p:cNvCxnSpPr/>
+          <p:nvPr/>
+        </p:nvCxnSpPr>
+        <p:spPr>
+          <a:xfrm flipH="1" flipV="1">
+            <a:off x="2722268" y="1977914"/>
+            <a:ext cx="447770" cy="1707169"/>
+          </a:xfrm>
+          <a:prstGeom prst="straightConnector1">
+            <a:avLst/>
+          </a:prstGeom>
+          <a:ln w="38100">
+            <a:solidFill>
+              <a:schemeClr val="tx1"/>
+            </a:solidFill>
+            <a:tailEnd type="triangle"/>
+          </a:ln>
+        </p:spPr>
+        <p:style>
+          <a:lnRef idx="1">
+            <a:schemeClr val="accent1"/>
+          </a:lnRef>
+          <a:fillRef idx="0">
+            <a:schemeClr val="accent1"/>
+          </a:fillRef>
+          <a:effectRef idx="0">
+            <a:schemeClr val="accent1"/>
+          </a:effectRef>
+          <a:fontRef idx="minor">
+            <a:schemeClr val="tx1"/>
+          </a:fontRef>
+        </p:style>
+      </p:cxnSp>
+      <p:sp>
+        <p:nvSpPr>
+          <p:cNvPr id="16" name="Seta para baixo 15"/>
+          <p:cNvSpPr/>
+          <p:nvPr/>
+        </p:nvSpPr>
+        <p:spPr>
+          <a:xfrm rot="16200000">
+            <a:off x="913219" y="3909362"/>
+            <a:ext cx="309243" cy="442827"/>
+          </a:xfrm>
+          <a:prstGeom prst="downArrow">
+            <a:avLst/>
+          </a:prstGeom>
+          <a:noFill/>
+          <a:ln w="38100">
+            <a:solidFill>
+              <a:schemeClr val="tx1"/>
+            </a:solidFill>
+          </a:ln>
+        </p:spPr>
+        <p:style>
+          <a:lnRef idx="2">
+            <a:schemeClr val="accent1">
+              <a:shade val="50000"/>
+            </a:schemeClr>
+          </a:lnRef>
+          <a:fillRef idx="1">
+            <a:schemeClr val="accent1"/>
+          </a:fillRef>
+          <a:effectRef idx="0">
+            <a:schemeClr val="accent1"/>
+          </a:effectRef>
+          <a:fontRef idx="minor">
+            <a:schemeClr val="lt1"/>
+          </a:fontRef>
+        </p:style>
+        <p:txBody>
+          <a:bodyPr rtlCol="0" anchor="ctr"/>
+          <a:lstStyle/>
+          <a:p>
+            <a:pPr algn="ctr"/>
+            <a:endParaRPr lang="pt-BR"/>
+          </a:p>
+        </p:txBody>
+      </p:sp>
+      <p:sp>
+        <p:nvSpPr>
+          <p:cNvPr id="17" name="CaixaDeTexto 16"/>
+          <p:cNvSpPr txBox="1"/>
+          <p:nvPr/>
+        </p:nvSpPr>
+        <p:spPr>
+          <a:xfrm>
+            <a:off x="4768625" y="1417863"/>
+            <a:ext cx="4375375" cy="461665"/>
+          </a:xfrm>
+          <a:prstGeom prst="rect">
+            <a:avLst/>
+          </a:prstGeom>
+          <a:noFill/>
+        </p:spPr>
+        <p:txBody>
+          <a:bodyPr wrap="square" rtlCol="0">
+            <a:spAutoFit/>
+          </a:bodyPr>
+          <a:lstStyle/>
+          <a:p>
+            <a:r>
+              <a:rPr lang="pt-BR" sz="2400" b="1" dirty="0" smtClean="0">
+                <a:latin typeface="Consolas" panose="020B0609020204030204" pitchFamily="49" charset="0"/>
+              </a:rPr>
+              <a:t>Testa se i é menor que 4</a:t>
+            </a:r>
+            <a:endParaRPr lang="pt-BR" sz="2400" b="1" dirty="0">
+              <a:latin typeface="Consolas" panose="020B0609020204030204" pitchFamily="49" charset="0"/>
+            </a:endParaRPr>
+          </a:p>
+        </p:txBody>
+      </p:sp>
+      <p:cxnSp>
+        <p:nvCxnSpPr>
+          <p:cNvPr id="18" name="Conector de seta reta 17"/>
+          <p:cNvCxnSpPr/>
+          <p:nvPr/>
+        </p:nvCxnSpPr>
+        <p:spPr>
+          <a:xfrm flipV="1">
+            <a:off x="5216396" y="1896455"/>
+            <a:ext cx="1144233" cy="1788628"/>
+          </a:xfrm>
+          <a:prstGeom prst="straightConnector1">
+            <a:avLst/>
+          </a:prstGeom>
+          <a:ln w="38100">
+            <a:solidFill>
+              <a:schemeClr val="tx1"/>
+            </a:solidFill>
+            <a:tailEnd type="triangle"/>
+          </a:ln>
+        </p:spPr>
+        <p:style>
+          <a:lnRef idx="1">
+            <a:schemeClr val="accent1"/>
+          </a:lnRef>
+          <a:fillRef idx="0">
+            <a:schemeClr val="accent1"/>
+          </a:fillRef>
+          <a:effectRef idx="0">
+            <a:schemeClr val="accent1"/>
+          </a:effectRef>
+          <a:fontRef idx="minor">
+            <a:schemeClr val="tx1"/>
+          </a:fontRef>
+        </p:style>
+      </p:cxnSp>
+      <p:sp>
+        <p:nvSpPr>
+          <p:cNvPr id="22" name="CaixaDeTexto 21"/>
+          <p:cNvSpPr txBox="1"/>
+          <p:nvPr/>
+        </p:nvSpPr>
+        <p:spPr>
+          <a:xfrm>
+            <a:off x="7086600" y="2037805"/>
+            <a:ext cx="1390571" cy="461665"/>
+          </a:xfrm>
+          <a:prstGeom prst="rect">
+            <a:avLst/>
+          </a:prstGeom>
+          <a:noFill/>
+        </p:spPr>
+        <p:txBody>
+          <a:bodyPr wrap="square" rtlCol="0">
+            <a:spAutoFit/>
+          </a:bodyPr>
+          <a:lstStyle/>
+          <a:p>
+            <a:r>
+              <a:rPr lang="pt-BR" sz="2400" b="1" dirty="0" err="1" smtClean="0">
+                <a:solidFill>
+                  <a:srgbClr val="00FF00"/>
+                </a:solidFill>
+                <a:latin typeface="Consolas" panose="020B0609020204030204" pitchFamily="49" charset="0"/>
+              </a:rPr>
+              <a:t>true</a:t>
+            </a:r>
+            <a:endParaRPr lang="pt-BR" sz="2400" b="1" dirty="0">
+              <a:solidFill>
+                <a:srgbClr val="00FF00"/>
+              </a:solidFill>
+              <a:latin typeface="Consolas" panose="020B0609020204030204" pitchFamily="49" charset="0"/>
+            </a:endParaRPr>
+          </a:p>
+        </p:txBody>
+      </p:sp>
+      <p:cxnSp>
+        <p:nvCxnSpPr>
+          <p:cNvPr id="23" name="Conector de seta reta 22"/>
+          <p:cNvCxnSpPr/>
+          <p:nvPr/>
+        </p:nvCxnSpPr>
+        <p:spPr>
+          <a:xfrm>
+            <a:off x="6537751" y="1977912"/>
+            <a:ext cx="548849" cy="351192"/>
+          </a:xfrm>
+          <a:prstGeom prst="straightConnector1">
+            <a:avLst/>
+          </a:prstGeom>
+          <a:ln w="38100">
+            <a:solidFill>
+              <a:srgbClr val="00FF00"/>
+            </a:solidFill>
+            <a:tailEnd type="triangle"/>
+          </a:ln>
+        </p:spPr>
+        <p:style>
+          <a:lnRef idx="1">
+            <a:schemeClr val="accent1"/>
+          </a:lnRef>
+          <a:fillRef idx="0">
+            <a:schemeClr val="accent1"/>
+          </a:fillRef>
+          <a:effectRef idx="0">
+            <a:schemeClr val="accent1"/>
+          </a:effectRef>
+          <a:fontRef idx="minor">
+            <a:schemeClr val="tx1"/>
+          </a:fontRef>
+        </p:style>
+      </p:cxnSp>
+    </p:spTree>
+    <p:extLst>
+      <p:ext uri="{BB962C8B-B14F-4D97-AF65-F5344CB8AC3E}">
+        <p14:creationId xmlns:p14="http://schemas.microsoft.com/office/powerpoint/2010/main" val="3555976388"/>
+      </p:ext>
+    </p:extLst>
+  </p:cSld>
+  <p:clrMapOvr>
+    <a:masterClrMapping/>
+  </p:clrMapOvr>
+  <p:timing>
+    <p:tnLst>
+      <p:par>
+        <p:cTn id="1" dur="indefinite" restart="never" nodeType="tmRoot">
+          <p:childTnLst>
+            <p:seq concurrent="1" nextAc="seek">
+              <p:cTn id="2" dur="indefinite" nodeType="mainSeq">
+                <p:childTnLst>
+                  <p:par>
+                    <p:cTn id="3" fill="hold">
+                      <p:stCondLst>
+                        <p:cond delay="indefinite"/>
+                      </p:stCondLst>
+                      <p:childTnLst>
+                        <p:par>
+                          <p:cTn id="4" fill="hold">
+                            <p:stCondLst>
+                              <p:cond delay="0"/>
+                            </p:stCondLst>
+                            <p:childTnLst>
+                              <p:par>
+                                <p:cTn id="5" presetID="10" presetClass="entr" presetSubtype="0" fill="hold" grpId="0" nodeType="clickEffect">
+                                  <p:stCondLst>
+                                    <p:cond delay="0"/>
+                                  </p:stCondLst>
+                                  <p:childTnLst>
+                                    <p:set>
+                                      <p:cBhvr>
+                                        <p:cTn id="6" dur="1" fill="hold">
+                                          <p:stCondLst>
+                                            <p:cond delay="0"/>
+                                          </p:stCondLst>
+                                        </p:cTn>
+                                        <p:tgtEl>
+                                          <p:spTgt spid="17"/>
+                                        </p:tgtEl>
+                                        <p:attrNameLst>
+                                          <p:attrName>style.visibility</p:attrName>
+                                        </p:attrNameLst>
+                                      </p:cBhvr>
+                                      <p:to>
+                                        <p:strVal val="visible"/>
+                                      </p:to>
+                                    </p:set>
+                                    <p:animEffect transition="in" filter="fade">
+                                      <p:cBhvr>
+                                        <p:cTn id="7" dur="500"/>
+                                        <p:tgtEl>
+                                          <p:spTgt spid="17"/>
+                                        </p:tgtEl>
+                                      </p:cBhvr>
+                                    </p:animEffect>
+                                  </p:childTnLst>
+                                </p:cTn>
+                              </p:par>
+                              <p:par>
+                                <p:cTn id="8" presetID="10" presetClass="entr" presetSubtype="0" fill="hold" nodeType="withEffect">
+                                  <p:stCondLst>
+                                    <p:cond delay="0"/>
+                                  </p:stCondLst>
+                                  <p:childTnLst>
+                                    <p:set>
+                                      <p:cBhvr>
+                                        <p:cTn id="9" dur="1" fill="hold">
+                                          <p:stCondLst>
+                                            <p:cond delay="0"/>
+                                          </p:stCondLst>
+                                        </p:cTn>
+                                        <p:tgtEl>
+                                          <p:spTgt spid="18"/>
+                                        </p:tgtEl>
+                                        <p:attrNameLst>
+                                          <p:attrName>style.visibility</p:attrName>
+                                        </p:attrNameLst>
+                                      </p:cBhvr>
+                                      <p:to>
+                                        <p:strVal val="visible"/>
+                                      </p:to>
+                                    </p:set>
+                                    <p:animEffect transition="in" filter="fade">
+                                      <p:cBhvr>
+                                        <p:cTn id="10" dur="500"/>
+                                        <p:tgtEl>
+                                          <p:spTgt spid="18"/>
+                                        </p:tgtEl>
+                                      </p:cBhvr>
+                                    </p:animEffect>
+                                  </p:childTnLst>
+                                </p:cTn>
+                              </p:par>
+                            </p:childTnLst>
+                          </p:cTn>
+                        </p:par>
+                      </p:childTnLst>
+                    </p:cTn>
+                  </p:par>
+                  <p:par>
+                    <p:cTn id="11" fill="hold">
+                      <p:stCondLst>
+                        <p:cond delay="indefinite"/>
+                      </p:stCondLst>
+                      <p:childTnLst>
+                        <p:par>
+                          <p:cTn id="12" fill="hold">
+                            <p:stCondLst>
+                              <p:cond delay="0"/>
+                            </p:stCondLst>
+                            <p:childTnLst>
+                              <p:par>
+                                <p:cTn id="13" presetID="10" presetClass="entr" presetSubtype="0" fill="hold" grpId="0" nodeType="clickEffect">
+                                  <p:stCondLst>
+                                    <p:cond delay="0"/>
+                                  </p:stCondLst>
+                                  <p:childTnLst>
+                                    <p:set>
+                                      <p:cBhvr>
+                                        <p:cTn id="14" dur="1" fill="hold">
+                                          <p:stCondLst>
+                                            <p:cond delay="0"/>
+                                          </p:stCondLst>
+                                        </p:cTn>
+                                        <p:tgtEl>
+                                          <p:spTgt spid="22"/>
+                                        </p:tgtEl>
+                                        <p:attrNameLst>
+                                          <p:attrName>style.visibility</p:attrName>
+                                        </p:attrNameLst>
+                                      </p:cBhvr>
+                                      <p:to>
+                                        <p:strVal val="visible"/>
+                                      </p:to>
+                                    </p:set>
+                                    <p:animEffect transition="in" filter="fade">
+                                      <p:cBhvr>
+                                        <p:cTn id="15" dur="500"/>
+                                        <p:tgtEl>
+                                          <p:spTgt spid="22"/>
+                                        </p:tgtEl>
+                                      </p:cBhvr>
+                                    </p:animEffect>
+                                  </p:childTnLst>
+                                </p:cTn>
+                              </p:par>
+                              <p:par>
+                                <p:cTn id="16" presetID="10" presetClass="entr" presetSubtype="0" fill="hold" nodeType="withEffect">
+                                  <p:stCondLst>
+                                    <p:cond delay="0"/>
+                                  </p:stCondLst>
+                                  <p:childTnLst>
+                                    <p:set>
+                                      <p:cBhvr>
+                                        <p:cTn id="17" dur="1" fill="hold">
+                                          <p:stCondLst>
+                                            <p:cond delay="0"/>
+                                          </p:stCondLst>
+                                        </p:cTn>
+                                        <p:tgtEl>
+                                          <p:spTgt spid="23"/>
+                                        </p:tgtEl>
+                                        <p:attrNameLst>
+                                          <p:attrName>style.visibility</p:attrName>
+                                        </p:attrNameLst>
+                                      </p:cBhvr>
+                                      <p:to>
+                                        <p:strVal val="visible"/>
+                                      </p:to>
+                                    </p:set>
+                                    <p:animEffect transition="in" filter="fade">
+                                      <p:cBhvr>
+                                        <p:cTn id="18" dur="500"/>
+                                        <p:tgtEl>
+                                          <p:spTgt spid="23"/>
+                                        </p:tgtEl>
+                                      </p:cBhvr>
+                                    </p:animEffect>
+                                  </p:childTnLst>
+                                </p:cTn>
+                              </p:par>
+                            </p:childTnLst>
+                          </p:cTn>
+                        </p:par>
+                      </p:childTnLst>
+                    </p:cTn>
+                  </p:par>
+                </p:childTnLst>
+              </p:cTn>
+              <p:prevCondLst>
+                <p:cond evt="onPrev" delay="0">
+                  <p:tgtEl>
+                    <p:sldTgt/>
+                  </p:tgtEl>
+                </p:cond>
+              </p:prevCondLst>
+              <p:nextCondLst>
+                <p:cond evt="onNext" delay="0">
+                  <p:tgtEl>
+                    <p:sldTgt/>
+                  </p:tgtEl>
+                </p:cond>
+              </p:nextCondLst>
+            </p:seq>
+          </p:childTnLst>
+        </p:cTn>
+      </p:par>
+    </p:tnLst>
+    <p:bldLst>
+      <p:bldP spid="17" grpId="0"/>
+      <p:bldP spid="22" grpId="0"/>
+    </p:bldLst>
+  </p:timing>
+</p:sld>
+</file>
+
+<file path=ppt/slides/slide43.xml><?xml version="1.0" encoding="utf-8"?>
+<p:sld xmlns:a="http://schemas.openxmlformats.org/drawingml/2006/main" xmlns:r="http://schemas.openxmlformats.org/officeDocument/2006/relationships" xmlns:p="http://schemas.openxmlformats.org/presentationml/2006/main">
+  <p:cSld>
+    <p:spTree>
+      <p:nvGrpSpPr>
+        <p:cNvPr id="1" name=""/>
+        <p:cNvGrpSpPr/>
+        <p:nvPr/>
+      </p:nvGrpSpPr>
+      <p:grpSpPr>
+        <a:xfrm>
+          <a:off x="0" y="0"/>
+          <a:ext cx="0" cy="0"/>
+          <a:chOff x="0" y="0"/>
+          <a:chExt cx="0" cy="0"/>
+        </a:xfrm>
+      </p:grpSpPr>
+      <p:pic>
+        <p:nvPicPr>
+          <p:cNvPr id="8" name="Imagem 7"/>
+          <p:cNvPicPr>
+            <a:picLocks noChangeAspect="1"/>
+          </p:cNvPicPr>
+          <p:nvPr/>
+        </p:nvPicPr>
+        <p:blipFill>
+          <a:blip r:embed="rId2"/>
+          <a:stretch>
+            <a:fillRect/>
+          </a:stretch>
+        </p:blipFill>
+        <p:spPr>
+          <a:xfrm>
+            <a:off x="480725" y="2803023"/>
+            <a:ext cx="10609524" cy="2800000"/>
+          </a:xfrm>
+          <a:prstGeom prst="rect">
+            <a:avLst/>
+          </a:prstGeom>
+        </p:spPr>
+      </p:pic>
+      <p:sp>
+        <p:nvSpPr>
+          <p:cNvPr id="2" name="Título 1"/>
+          <p:cNvSpPr>
+            <a:spLocks noGrp="1"/>
+          </p:cNvSpPr>
+          <p:nvPr>
+            <p:ph type="title"/>
+          </p:nvPr>
+        </p:nvSpPr>
+        <p:spPr>
+          <a:xfrm>
+            <a:off x="480725" y="385591"/>
+            <a:ext cx="7914128" cy="685753"/>
+          </a:xfrm>
+        </p:spPr>
+        <p:txBody>
+          <a:bodyPr>
+            <a:normAutofit/>
+          </a:bodyPr>
+          <a:lstStyle/>
+          <a:p>
+            <a:r>
+              <a:rPr lang="pt-BR" sz="3200" dirty="0" smtClean="0">
+                <a:latin typeface="Consolas" panose="020B0609020204030204" pitchFamily="49" charset="0"/>
+              </a:rPr>
+              <a:t>Estrutura de repetição For</a:t>
+            </a:r>
+            <a:endParaRPr lang="pt-BR" sz="3200" dirty="0">
+              <a:latin typeface="Consolas" panose="020B0609020204030204" pitchFamily="49" charset="0"/>
+            </a:endParaRPr>
+          </a:p>
+        </p:txBody>
+      </p:sp>
+      <p:pic>
+        <p:nvPicPr>
+          <p:cNvPr id="4" name="Imagem 3"/>
+          <p:cNvPicPr>
+            <a:picLocks noChangeAspect="1"/>
+          </p:cNvPicPr>
+          <p:nvPr/>
+        </p:nvPicPr>
+        <p:blipFill>
+          <a:blip r:embed="rId3" cstate="print">
+            <a:extLst>
+              <a:ext uri="{28A0092B-C50C-407E-A947-70E740481C1C}">
+                <a14:useLocalDpi xmlns:a14="http://schemas.microsoft.com/office/drawing/2010/main" val="0"/>
+              </a:ext>
+            </a:extLst>
+          </a:blip>
+          <a:stretch>
+            <a:fillRect/>
+          </a:stretch>
+        </p:blipFill>
+        <p:spPr>
+          <a:xfrm>
+            <a:off x="10441211" y="110689"/>
+            <a:ext cx="1750789" cy="2157949"/>
+          </a:xfrm>
+          <a:prstGeom prst="rect">
+            <a:avLst/>
+          </a:prstGeom>
+        </p:spPr>
+      </p:pic>
+      <p:sp>
+        <p:nvSpPr>
+          <p:cNvPr id="5" name="CaixaDeTexto 4"/>
+          <p:cNvSpPr txBox="1"/>
+          <p:nvPr/>
+        </p:nvSpPr>
+        <p:spPr>
+          <a:xfrm>
+            <a:off x="8099610" y="4185984"/>
+            <a:ext cx="2210356" cy="954107"/>
+          </a:xfrm>
+          <a:prstGeom prst="rect">
+            <a:avLst/>
+          </a:prstGeom>
+          <a:noFill/>
+        </p:spPr>
+        <p:txBody>
+          <a:bodyPr wrap="square" rtlCol="0">
+            <a:spAutoFit/>
+          </a:bodyPr>
+          <a:lstStyle/>
+          <a:p>
+            <a:r>
+              <a:rPr lang="pt-BR" sz="2800" b="1" dirty="0" smtClean="0">
+                <a:latin typeface="Consolas" panose="020B0609020204030204" pitchFamily="49" charset="0"/>
+              </a:rPr>
+              <a:t>Imprime 0 na tela</a:t>
+            </a:r>
+            <a:endParaRPr lang="pt-BR" sz="2800" b="1" dirty="0">
+              <a:latin typeface="Consolas" panose="020B0609020204030204" pitchFamily="49" charset="0"/>
+            </a:endParaRPr>
+          </a:p>
+        </p:txBody>
+      </p:sp>
+      <p:cxnSp>
+        <p:nvCxnSpPr>
+          <p:cNvPr id="6" name="Conector de seta reta 5"/>
+          <p:cNvCxnSpPr/>
+          <p:nvPr/>
+        </p:nvCxnSpPr>
+        <p:spPr>
+          <a:xfrm>
+            <a:off x="6800204" y="4698206"/>
+            <a:ext cx="1223206" cy="7144"/>
+          </a:xfrm>
+          <a:prstGeom prst="straightConnector1">
+            <a:avLst/>
+          </a:prstGeom>
+          <a:ln w="38100">
+            <a:solidFill>
+              <a:schemeClr val="tx1"/>
+            </a:solidFill>
+            <a:tailEnd type="triangle"/>
+          </a:ln>
+        </p:spPr>
+        <p:style>
+          <a:lnRef idx="1">
+            <a:schemeClr val="accent1"/>
+          </a:lnRef>
+          <a:fillRef idx="0">
+            <a:schemeClr val="accent1"/>
+          </a:fillRef>
+          <a:effectRef idx="0">
+            <a:schemeClr val="accent1"/>
+          </a:effectRef>
+          <a:fontRef idx="minor">
+            <a:schemeClr val="tx1"/>
+          </a:fontRef>
+        </p:style>
+      </p:cxnSp>
+      <p:sp>
+        <p:nvSpPr>
+          <p:cNvPr id="16" name="Seta para baixo 15"/>
+          <p:cNvSpPr/>
+          <p:nvPr/>
+        </p:nvSpPr>
+        <p:spPr>
+          <a:xfrm rot="16200000">
+            <a:off x="1768241" y="4441625"/>
+            <a:ext cx="309243" cy="442827"/>
+          </a:xfrm>
+          <a:prstGeom prst="downArrow">
+            <a:avLst/>
+          </a:prstGeom>
+          <a:noFill/>
+          <a:ln w="38100">
+            <a:solidFill>
+              <a:schemeClr val="tx1"/>
+            </a:solidFill>
+          </a:ln>
+        </p:spPr>
+        <p:style>
+          <a:lnRef idx="2">
+            <a:schemeClr val="accent1">
+              <a:shade val="50000"/>
+            </a:schemeClr>
+          </a:lnRef>
+          <a:fillRef idx="1">
+            <a:schemeClr val="accent1"/>
+          </a:fillRef>
+          <a:effectRef idx="0">
+            <a:schemeClr val="accent1"/>
+          </a:effectRef>
+          <a:fontRef idx="minor">
+            <a:schemeClr val="lt1"/>
+          </a:fontRef>
+        </p:style>
+        <p:txBody>
+          <a:bodyPr rtlCol="0" anchor="ctr"/>
+          <a:lstStyle/>
+          <a:p>
+            <a:pPr algn="ctr"/>
+            <a:endParaRPr lang="pt-BR"/>
+          </a:p>
+        </p:txBody>
+      </p:sp>
+    </p:spTree>
+    <p:extLst>
+      <p:ext uri="{BB962C8B-B14F-4D97-AF65-F5344CB8AC3E}">
+        <p14:creationId xmlns:p14="http://schemas.microsoft.com/office/powerpoint/2010/main" val="4087973174"/>
+      </p:ext>
+    </p:extLst>
+  </p:cSld>
+  <p:clrMapOvr>
+    <a:masterClrMapping/>
+  </p:clrMapOvr>
+  <p:timing>
+    <p:tnLst>
+      <p:par>
+        <p:cTn id="1" dur="indefinite" restart="never" nodeType="tmRoot"/>
+      </p:par>
+    </p:tnLst>
+  </p:timing>
+</p:sld>
+</file>
+
+<file path=ppt/slides/slide44.xml><?xml version="1.0" encoding="utf-8"?>
+<p:sld xmlns:a="http://schemas.openxmlformats.org/drawingml/2006/main" xmlns:r="http://schemas.openxmlformats.org/officeDocument/2006/relationships" xmlns:p="http://schemas.openxmlformats.org/presentationml/2006/main">
+  <p:cSld>
+    <p:spTree>
+      <p:nvGrpSpPr>
+        <p:cNvPr id="1" name=""/>
+        <p:cNvGrpSpPr/>
+        <p:nvPr/>
+      </p:nvGrpSpPr>
+      <p:grpSpPr>
+        <a:xfrm>
+          <a:off x="0" y="0"/>
+          <a:ext cx="0" cy="0"/>
+          <a:chOff x="0" y="0"/>
+          <a:chExt cx="0" cy="0"/>
+        </a:xfrm>
+      </p:grpSpPr>
+      <p:pic>
+        <p:nvPicPr>
+          <p:cNvPr id="8" name="Imagem 7"/>
+          <p:cNvPicPr>
+            <a:picLocks noChangeAspect="1"/>
+          </p:cNvPicPr>
+          <p:nvPr/>
+        </p:nvPicPr>
+        <p:blipFill>
+          <a:blip r:embed="rId2"/>
+          <a:stretch>
+            <a:fillRect/>
+          </a:stretch>
+        </p:blipFill>
+        <p:spPr>
+          <a:xfrm>
+            <a:off x="480725" y="2803023"/>
+            <a:ext cx="10609524" cy="2800000"/>
+          </a:xfrm>
+          <a:prstGeom prst="rect">
+            <a:avLst/>
+          </a:prstGeom>
+        </p:spPr>
+      </p:pic>
+      <p:sp>
+        <p:nvSpPr>
+          <p:cNvPr id="2" name="Título 1"/>
+          <p:cNvSpPr>
+            <a:spLocks noGrp="1"/>
+          </p:cNvSpPr>
+          <p:nvPr>
+            <p:ph type="title"/>
+          </p:nvPr>
+        </p:nvSpPr>
+        <p:spPr>
+          <a:xfrm>
+            <a:off x="480725" y="385591"/>
+            <a:ext cx="7914128" cy="685753"/>
+          </a:xfrm>
+        </p:spPr>
+        <p:txBody>
+          <a:bodyPr>
+            <a:normAutofit/>
+          </a:bodyPr>
+          <a:lstStyle/>
+          <a:p>
+            <a:r>
+              <a:rPr lang="pt-BR" sz="3200" dirty="0" smtClean="0">
+                <a:latin typeface="Consolas" panose="020B0609020204030204" pitchFamily="49" charset="0"/>
+              </a:rPr>
+              <a:t>Estrutura de repetição For</a:t>
+            </a:r>
+            <a:endParaRPr lang="pt-BR" sz="3200" dirty="0">
+              <a:latin typeface="Consolas" panose="020B0609020204030204" pitchFamily="49" charset="0"/>
+            </a:endParaRPr>
+          </a:p>
+        </p:txBody>
+      </p:sp>
+      <p:pic>
+        <p:nvPicPr>
+          <p:cNvPr id="4" name="Imagem 3"/>
+          <p:cNvPicPr>
+            <a:picLocks noChangeAspect="1"/>
+          </p:cNvPicPr>
+          <p:nvPr/>
+        </p:nvPicPr>
+        <p:blipFill>
+          <a:blip r:embed="rId3" cstate="print">
+            <a:extLst>
+              <a:ext uri="{28A0092B-C50C-407E-A947-70E740481C1C}">
+                <a14:useLocalDpi xmlns:a14="http://schemas.microsoft.com/office/drawing/2010/main" val="0"/>
+              </a:ext>
+            </a:extLst>
+          </a:blip>
+          <a:stretch>
+            <a:fillRect/>
+          </a:stretch>
+        </p:blipFill>
+        <p:spPr>
+          <a:xfrm>
+            <a:off x="10441211" y="110689"/>
+            <a:ext cx="1750789" cy="2157949"/>
+          </a:xfrm>
+          <a:prstGeom prst="rect">
+            <a:avLst/>
+          </a:prstGeom>
+        </p:spPr>
+      </p:pic>
+      <p:sp>
+        <p:nvSpPr>
+          <p:cNvPr id="16" name="Seta para baixo 15"/>
+          <p:cNvSpPr/>
+          <p:nvPr/>
+        </p:nvSpPr>
+        <p:spPr>
+          <a:xfrm rot="16200000">
+            <a:off x="913219" y="3909362"/>
+            <a:ext cx="309243" cy="442827"/>
+          </a:xfrm>
+          <a:prstGeom prst="downArrow">
+            <a:avLst/>
+          </a:prstGeom>
+          <a:noFill/>
+          <a:ln w="38100">
+            <a:solidFill>
+              <a:schemeClr val="tx1"/>
+            </a:solidFill>
+          </a:ln>
+        </p:spPr>
+        <p:style>
+          <a:lnRef idx="2">
+            <a:schemeClr val="accent1">
+              <a:shade val="50000"/>
+            </a:schemeClr>
+          </a:lnRef>
+          <a:fillRef idx="1">
+            <a:schemeClr val="accent1"/>
+          </a:fillRef>
+          <a:effectRef idx="0">
+            <a:schemeClr val="accent1"/>
+          </a:effectRef>
+          <a:fontRef idx="minor">
+            <a:schemeClr val="lt1"/>
+          </a:fontRef>
+        </p:style>
+        <p:txBody>
+          <a:bodyPr rtlCol="0" anchor="ctr"/>
+          <a:lstStyle/>
+          <a:p>
+            <a:pPr algn="ctr"/>
+            <a:endParaRPr lang="pt-BR"/>
+          </a:p>
+        </p:txBody>
+      </p:sp>
+      <p:sp>
+        <p:nvSpPr>
+          <p:cNvPr id="17" name="CaixaDeTexto 16"/>
+          <p:cNvSpPr txBox="1"/>
+          <p:nvPr/>
+        </p:nvSpPr>
+        <p:spPr>
+          <a:xfrm>
+            <a:off x="7410226" y="1071344"/>
+            <a:ext cx="2046358" cy="1200329"/>
+          </a:xfrm>
+          <a:prstGeom prst="rect">
+            <a:avLst/>
+          </a:prstGeom>
+          <a:noFill/>
+        </p:spPr>
+        <p:txBody>
+          <a:bodyPr wrap="square" rtlCol="0">
+            <a:spAutoFit/>
+          </a:bodyPr>
+          <a:lstStyle/>
+          <a:p>
+            <a:r>
+              <a:rPr lang="pt-BR" sz="2400" b="1" dirty="0" smtClean="0">
+                <a:latin typeface="Consolas" panose="020B0609020204030204" pitchFamily="49" charset="0"/>
+              </a:rPr>
+              <a:t>Incrementa i, i passa valer 1</a:t>
+            </a:r>
+            <a:endParaRPr lang="pt-BR" sz="2400" b="1" dirty="0">
+              <a:latin typeface="Consolas" panose="020B0609020204030204" pitchFamily="49" charset="0"/>
+            </a:endParaRPr>
+          </a:p>
+        </p:txBody>
+      </p:sp>
+      <p:cxnSp>
+        <p:nvCxnSpPr>
+          <p:cNvPr id="18" name="Conector de seta reta 17"/>
+          <p:cNvCxnSpPr/>
+          <p:nvPr/>
+        </p:nvCxnSpPr>
+        <p:spPr>
+          <a:xfrm flipV="1">
+            <a:off x="6337300" y="2120900"/>
+            <a:ext cx="1072925" cy="1855255"/>
+          </a:xfrm>
+          <a:prstGeom prst="straightConnector1">
+            <a:avLst/>
+          </a:prstGeom>
+          <a:ln w="38100">
+            <a:solidFill>
+              <a:schemeClr val="tx1"/>
+            </a:solidFill>
+            <a:tailEnd type="triangle"/>
+          </a:ln>
+        </p:spPr>
+        <p:style>
+          <a:lnRef idx="1">
+            <a:schemeClr val="accent1"/>
+          </a:lnRef>
+          <a:fillRef idx="0">
+            <a:schemeClr val="accent1"/>
+          </a:fillRef>
+          <a:effectRef idx="0">
+            <a:schemeClr val="accent1"/>
+          </a:effectRef>
+          <a:fontRef idx="minor">
+            <a:schemeClr val="tx1"/>
+          </a:fontRef>
+        </p:style>
+      </p:cxnSp>
+    </p:spTree>
+    <p:extLst>
+      <p:ext uri="{BB962C8B-B14F-4D97-AF65-F5344CB8AC3E}">
+        <p14:creationId xmlns:p14="http://schemas.microsoft.com/office/powerpoint/2010/main" val="2967338979"/>
+      </p:ext>
+    </p:extLst>
+  </p:cSld>
+  <p:clrMapOvr>
+    <a:masterClrMapping/>
+  </p:clrMapOvr>
+  <p:timing>
+    <p:tnLst>
+      <p:par>
+        <p:cTn id="1" dur="indefinite" restart="never" nodeType="tmRoot"/>
+      </p:par>
+    </p:tnLst>
+  </p:timing>
+</p:sld>
+</file>
+
+<file path=ppt/slides/slide45.xml><?xml version="1.0" encoding="utf-8"?>
+<p:sld xmlns:a="http://schemas.openxmlformats.org/drawingml/2006/main" xmlns:r="http://schemas.openxmlformats.org/officeDocument/2006/relationships" xmlns:p="http://schemas.openxmlformats.org/presentationml/2006/main">
+  <p:cSld>
+    <p:spTree>
+      <p:nvGrpSpPr>
+        <p:cNvPr id="1" name=""/>
+        <p:cNvGrpSpPr/>
+        <p:nvPr/>
+      </p:nvGrpSpPr>
+      <p:grpSpPr>
+        <a:xfrm>
+          <a:off x="0" y="0"/>
+          <a:ext cx="0" cy="0"/>
+          <a:chOff x="0" y="0"/>
+          <a:chExt cx="0" cy="0"/>
+        </a:xfrm>
+      </p:grpSpPr>
+      <p:pic>
+        <p:nvPicPr>
+          <p:cNvPr id="8" name="Imagem 7"/>
+          <p:cNvPicPr>
+            <a:picLocks noChangeAspect="1"/>
+          </p:cNvPicPr>
+          <p:nvPr/>
+        </p:nvPicPr>
+        <p:blipFill>
+          <a:blip r:embed="rId2"/>
+          <a:stretch>
+            <a:fillRect/>
+          </a:stretch>
+        </p:blipFill>
+        <p:spPr>
+          <a:xfrm>
+            <a:off x="480725" y="2803023"/>
+            <a:ext cx="10609524" cy="2800000"/>
+          </a:xfrm>
+          <a:prstGeom prst="rect">
+            <a:avLst/>
+          </a:prstGeom>
+        </p:spPr>
+      </p:pic>
+      <p:sp>
+        <p:nvSpPr>
+          <p:cNvPr id="2" name="Título 1"/>
+          <p:cNvSpPr>
+            <a:spLocks noGrp="1"/>
+          </p:cNvSpPr>
+          <p:nvPr>
+            <p:ph type="title"/>
+          </p:nvPr>
+        </p:nvSpPr>
+        <p:spPr>
+          <a:xfrm>
+            <a:off x="480725" y="385591"/>
+            <a:ext cx="7914128" cy="685753"/>
+          </a:xfrm>
+        </p:spPr>
+        <p:txBody>
+          <a:bodyPr>
+            <a:normAutofit/>
+          </a:bodyPr>
+          <a:lstStyle/>
+          <a:p>
+            <a:r>
+              <a:rPr lang="pt-BR" sz="3200" dirty="0" smtClean="0">
+                <a:latin typeface="Consolas" panose="020B0609020204030204" pitchFamily="49" charset="0"/>
+              </a:rPr>
+              <a:t>Estrutura de repetição For</a:t>
+            </a:r>
+            <a:endParaRPr lang="pt-BR" sz="3200" dirty="0">
+              <a:latin typeface="Consolas" panose="020B0609020204030204" pitchFamily="49" charset="0"/>
+            </a:endParaRPr>
+          </a:p>
+        </p:txBody>
+      </p:sp>
+      <p:pic>
+        <p:nvPicPr>
+          <p:cNvPr id="4" name="Imagem 3"/>
+          <p:cNvPicPr>
+            <a:picLocks noChangeAspect="1"/>
+          </p:cNvPicPr>
+          <p:nvPr/>
+        </p:nvPicPr>
+        <p:blipFill>
+          <a:blip r:embed="rId3" cstate="print">
+            <a:extLst>
+              <a:ext uri="{28A0092B-C50C-407E-A947-70E740481C1C}">
+                <a14:useLocalDpi xmlns:a14="http://schemas.microsoft.com/office/drawing/2010/main" val="0"/>
+              </a:ext>
+            </a:extLst>
+          </a:blip>
+          <a:stretch>
+            <a:fillRect/>
+          </a:stretch>
+        </p:blipFill>
+        <p:spPr>
+          <a:xfrm>
+            <a:off x="10441211" y="110689"/>
+            <a:ext cx="1750789" cy="2157949"/>
+          </a:xfrm>
+          <a:prstGeom prst="rect">
+            <a:avLst/>
+          </a:prstGeom>
+        </p:spPr>
+      </p:pic>
+      <p:sp>
+        <p:nvSpPr>
+          <p:cNvPr id="5" name="CaixaDeTexto 4"/>
+          <p:cNvSpPr txBox="1"/>
+          <p:nvPr/>
+        </p:nvSpPr>
+        <p:spPr>
+          <a:xfrm>
+            <a:off x="1458316" y="1417862"/>
+            <a:ext cx="2540036" cy="461665"/>
+          </a:xfrm>
+          <a:prstGeom prst="rect">
+            <a:avLst/>
+          </a:prstGeom>
+          <a:noFill/>
+        </p:spPr>
+        <p:txBody>
+          <a:bodyPr wrap="square" rtlCol="0">
+            <a:spAutoFit/>
+          </a:bodyPr>
+          <a:lstStyle/>
+          <a:p>
+            <a:r>
+              <a:rPr lang="pt-BR" sz="2400" b="1" dirty="0" smtClean="0">
+                <a:latin typeface="Consolas" panose="020B0609020204030204" pitchFamily="49" charset="0"/>
+              </a:rPr>
+              <a:t>Agora i é 1</a:t>
+            </a:r>
+            <a:endParaRPr lang="pt-BR" sz="2400" b="1" dirty="0">
+              <a:latin typeface="Consolas" panose="020B0609020204030204" pitchFamily="49" charset="0"/>
+            </a:endParaRPr>
+          </a:p>
+        </p:txBody>
+      </p:sp>
+      <p:sp>
+        <p:nvSpPr>
+          <p:cNvPr id="16" name="Seta para baixo 15"/>
+          <p:cNvSpPr/>
+          <p:nvPr/>
+        </p:nvSpPr>
+        <p:spPr>
+          <a:xfrm rot="16200000">
+            <a:off x="913219" y="3909362"/>
+            <a:ext cx="309243" cy="442827"/>
+          </a:xfrm>
+          <a:prstGeom prst="downArrow">
+            <a:avLst/>
+          </a:prstGeom>
+          <a:noFill/>
+          <a:ln w="38100">
+            <a:solidFill>
+              <a:schemeClr val="tx1"/>
+            </a:solidFill>
+          </a:ln>
+        </p:spPr>
+        <p:style>
+          <a:lnRef idx="2">
+            <a:schemeClr val="accent1">
+              <a:shade val="50000"/>
+            </a:schemeClr>
+          </a:lnRef>
+          <a:fillRef idx="1">
+            <a:schemeClr val="accent1"/>
+          </a:fillRef>
+          <a:effectRef idx="0">
+            <a:schemeClr val="accent1"/>
+          </a:effectRef>
+          <a:fontRef idx="minor">
+            <a:schemeClr val="lt1"/>
+          </a:fontRef>
+        </p:style>
+        <p:txBody>
+          <a:bodyPr rtlCol="0" anchor="ctr"/>
+          <a:lstStyle/>
+          <a:p>
+            <a:pPr algn="ctr"/>
+            <a:endParaRPr lang="pt-BR"/>
+          </a:p>
+        </p:txBody>
+      </p:sp>
+      <p:sp>
+        <p:nvSpPr>
+          <p:cNvPr id="17" name="CaixaDeTexto 16"/>
+          <p:cNvSpPr txBox="1"/>
+          <p:nvPr/>
+        </p:nvSpPr>
+        <p:spPr>
+          <a:xfrm>
+            <a:off x="4768625" y="1417863"/>
+            <a:ext cx="4375375" cy="461665"/>
+          </a:xfrm>
+          <a:prstGeom prst="rect">
+            <a:avLst/>
+          </a:prstGeom>
+          <a:noFill/>
+        </p:spPr>
+        <p:txBody>
+          <a:bodyPr wrap="square" rtlCol="0">
+            <a:spAutoFit/>
+          </a:bodyPr>
+          <a:lstStyle/>
+          <a:p>
+            <a:r>
+              <a:rPr lang="pt-BR" sz="2400" b="1" dirty="0" smtClean="0">
+                <a:latin typeface="Consolas" panose="020B0609020204030204" pitchFamily="49" charset="0"/>
+              </a:rPr>
+              <a:t>Testa se i é menor que 4</a:t>
+            </a:r>
+            <a:endParaRPr lang="pt-BR" sz="2400" b="1" dirty="0">
+              <a:latin typeface="Consolas" panose="020B0609020204030204" pitchFamily="49" charset="0"/>
+            </a:endParaRPr>
+          </a:p>
+        </p:txBody>
+      </p:sp>
+      <p:cxnSp>
+        <p:nvCxnSpPr>
+          <p:cNvPr id="18" name="Conector de seta reta 17"/>
+          <p:cNvCxnSpPr/>
+          <p:nvPr/>
+        </p:nvCxnSpPr>
+        <p:spPr>
+          <a:xfrm flipV="1">
+            <a:off x="5216396" y="1896455"/>
+            <a:ext cx="1144233" cy="1788628"/>
+          </a:xfrm>
+          <a:prstGeom prst="straightConnector1">
+            <a:avLst/>
+          </a:prstGeom>
+          <a:ln w="38100">
+            <a:solidFill>
+              <a:schemeClr val="tx1"/>
+            </a:solidFill>
+            <a:tailEnd type="triangle"/>
+          </a:ln>
+        </p:spPr>
+        <p:style>
+          <a:lnRef idx="1">
+            <a:schemeClr val="accent1"/>
+          </a:lnRef>
+          <a:fillRef idx="0">
+            <a:schemeClr val="accent1"/>
+          </a:fillRef>
+          <a:effectRef idx="0">
+            <a:schemeClr val="accent1"/>
+          </a:effectRef>
+          <a:fontRef idx="minor">
+            <a:schemeClr val="tx1"/>
+          </a:fontRef>
+        </p:style>
+      </p:cxnSp>
+      <p:sp>
+        <p:nvSpPr>
+          <p:cNvPr id="22" name="CaixaDeTexto 21"/>
+          <p:cNvSpPr txBox="1"/>
+          <p:nvPr/>
+        </p:nvSpPr>
+        <p:spPr>
+          <a:xfrm>
+            <a:off x="7086600" y="2037805"/>
+            <a:ext cx="1390571" cy="461665"/>
+          </a:xfrm>
+          <a:prstGeom prst="rect">
+            <a:avLst/>
+          </a:prstGeom>
+          <a:noFill/>
+        </p:spPr>
+        <p:txBody>
+          <a:bodyPr wrap="square" rtlCol="0">
+            <a:spAutoFit/>
+          </a:bodyPr>
+          <a:lstStyle/>
+          <a:p>
+            <a:r>
+              <a:rPr lang="pt-BR" sz="2400" b="1" dirty="0" err="1" smtClean="0">
+                <a:solidFill>
+                  <a:srgbClr val="00FF00"/>
+                </a:solidFill>
+                <a:latin typeface="Consolas" panose="020B0609020204030204" pitchFamily="49" charset="0"/>
+              </a:rPr>
+              <a:t>true</a:t>
+            </a:r>
+            <a:endParaRPr lang="pt-BR" sz="2400" b="1" dirty="0">
+              <a:solidFill>
+                <a:srgbClr val="00FF00"/>
+              </a:solidFill>
+              <a:latin typeface="Consolas" panose="020B0609020204030204" pitchFamily="49" charset="0"/>
+            </a:endParaRPr>
+          </a:p>
+        </p:txBody>
+      </p:sp>
+      <p:cxnSp>
+        <p:nvCxnSpPr>
+          <p:cNvPr id="23" name="Conector de seta reta 22"/>
+          <p:cNvCxnSpPr/>
+          <p:nvPr/>
+        </p:nvCxnSpPr>
+        <p:spPr>
+          <a:xfrm flipV="1">
+            <a:off x="5448300" y="2329104"/>
+            <a:ext cx="1638300" cy="1355979"/>
+          </a:xfrm>
+          <a:prstGeom prst="straightConnector1">
+            <a:avLst/>
+          </a:prstGeom>
+          <a:ln w="38100">
+            <a:solidFill>
+              <a:srgbClr val="00FF00"/>
+            </a:solidFill>
+            <a:tailEnd type="triangle"/>
+          </a:ln>
+        </p:spPr>
+        <p:style>
+          <a:lnRef idx="1">
+            <a:schemeClr val="accent1"/>
+          </a:lnRef>
+          <a:fillRef idx="0">
+            <a:schemeClr val="accent1"/>
+          </a:fillRef>
+          <a:effectRef idx="0">
+            <a:schemeClr val="accent1"/>
+          </a:effectRef>
+          <a:fontRef idx="minor">
+            <a:schemeClr val="tx1"/>
+          </a:fontRef>
+        </p:style>
+      </p:cxnSp>
+      <p:cxnSp>
+        <p:nvCxnSpPr>
+          <p:cNvPr id="13" name="Conector de seta reta 12"/>
+          <p:cNvCxnSpPr/>
+          <p:nvPr/>
+        </p:nvCxnSpPr>
+        <p:spPr>
+          <a:xfrm>
+            <a:off x="3547903" y="1671750"/>
+            <a:ext cx="1176420" cy="0"/>
+          </a:xfrm>
+          <a:prstGeom prst="straightConnector1">
+            <a:avLst/>
+          </a:prstGeom>
+          <a:ln w="38100">
+            <a:solidFill>
+              <a:schemeClr val="tx1"/>
+            </a:solidFill>
+            <a:tailEnd type="triangle"/>
+          </a:ln>
+        </p:spPr>
+        <p:style>
+          <a:lnRef idx="1">
+            <a:schemeClr val="accent1"/>
+          </a:lnRef>
+          <a:fillRef idx="0">
+            <a:schemeClr val="accent1"/>
+          </a:fillRef>
+          <a:effectRef idx="0">
+            <a:schemeClr val="accent1"/>
+          </a:effectRef>
+          <a:fontRef idx="minor">
+            <a:schemeClr val="tx1"/>
+          </a:fontRef>
+        </p:style>
+      </p:cxnSp>
+    </p:spTree>
+    <p:extLst>
+      <p:ext uri="{BB962C8B-B14F-4D97-AF65-F5344CB8AC3E}">
+        <p14:creationId xmlns:p14="http://schemas.microsoft.com/office/powerpoint/2010/main" val="3104950586"/>
+      </p:ext>
+    </p:extLst>
+  </p:cSld>
+  <p:clrMapOvr>
+    <a:masterClrMapping/>
+  </p:clrMapOvr>
+  <p:timing>
+    <p:tnLst>
+      <p:par>
+        <p:cTn id="1" dur="indefinite" restart="never" nodeType="tmRoot">
+          <p:childTnLst>
+            <p:seq concurrent="1" nextAc="seek">
+              <p:cTn id="2" dur="indefinite" nodeType="mainSeq">
+                <p:childTnLst>
+                  <p:par>
+                    <p:cTn id="3" fill="hold">
+                      <p:stCondLst>
+                        <p:cond delay="indefinite"/>
+                      </p:stCondLst>
+                      <p:childTnLst>
+                        <p:par>
+                          <p:cTn id="4" fill="hold">
+                            <p:stCondLst>
+                              <p:cond delay="0"/>
+                            </p:stCondLst>
+                            <p:childTnLst>
+                              <p:par>
+                                <p:cTn id="5" presetID="10" presetClass="entr" presetSubtype="0" fill="hold" grpId="0" nodeType="clickEffect">
+                                  <p:stCondLst>
+                                    <p:cond delay="0"/>
+                                  </p:stCondLst>
+                                  <p:childTnLst>
+                                    <p:set>
+                                      <p:cBhvr>
+                                        <p:cTn id="6" dur="1" fill="hold">
+                                          <p:stCondLst>
+                                            <p:cond delay="0"/>
+                                          </p:stCondLst>
+                                        </p:cTn>
+                                        <p:tgtEl>
+                                          <p:spTgt spid="22"/>
+                                        </p:tgtEl>
+                                        <p:attrNameLst>
+                                          <p:attrName>style.visibility</p:attrName>
+                                        </p:attrNameLst>
+                                      </p:cBhvr>
+                                      <p:to>
+                                        <p:strVal val="visible"/>
+                                      </p:to>
+                                    </p:set>
+                                    <p:animEffect transition="in" filter="fade">
+                                      <p:cBhvr>
+                                        <p:cTn id="7" dur="500"/>
+                                        <p:tgtEl>
+                                          <p:spTgt spid="22"/>
+                                        </p:tgtEl>
+                                      </p:cBhvr>
+                                    </p:animEffect>
+                                  </p:childTnLst>
+                                </p:cTn>
+                              </p:par>
+                              <p:par>
+                                <p:cTn id="8" presetID="10" presetClass="entr" presetSubtype="0" fill="hold" nodeType="withEffect">
+                                  <p:stCondLst>
+                                    <p:cond delay="0"/>
+                                  </p:stCondLst>
+                                  <p:childTnLst>
+                                    <p:set>
+                                      <p:cBhvr>
+                                        <p:cTn id="9" dur="1" fill="hold">
+                                          <p:stCondLst>
+                                            <p:cond delay="0"/>
+                                          </p:stCondLst>
+                                        </p:cTn>
+                                        <p:tgtEl>
+                                          <p:spTgt spid="23"/>
+                                        </p:tgtEl>
+                                        <p:attrNameLst>
+                                          <p:attrName>style.visibility</p:attrName>
+                                        </p:attrNameLst>
+                                      </p:cBhvr>
+                                      <p:to>
+                                        <p:strVal val="visible"/>
+                                      </p:to>
+                                    </p:set>
+                                    <p:animEffect transition="in" filter="fade">
+                                      <p:cBhvr>
+                                        <p:cTn id="10" dur="500"/>
+                                        <p:tgtEl>
+                                          <p:spTgt spid="23"/>
+                                        </p:tgtEl>
+                                      </p:cBhvr>
+                                    </p:animEffect>
+                                  </p:childTnLst>
+                                </p:cTn>
+                              </p:par>
+                            </p:childTnLst>
+                          </p:cTn>
+                        </p:par>
+                      </p:childTnLst>
+                    </p:cTn>
+                  </p:par>
+                </p:childTnLst>
+              </p:cTn>
+              <p:prevCondLst>
+                <p:cond evt="onPrev" delay="0">
+                  <p:tgtEl>
+                    <p:sldTgt/>
+                  </p:tgtEl>
+                </p:cond>
+              </p:prevCondLst>
+              <p:nextCondLst>
+                <p:cond evt="onNext" delay="0">
+                  <p:tgtEl>
+                    <p:sldTgt/>
+                  </p:tgtEl>
+                </p:cond>
+              </p:nextCondLst>
+            </p:seq>
+          </p:childTnLst>
+        </p:cTn>
+      </p:par>
+    </p:tnLst>
+    <p:bldLst>
+      <p:bldP spid="22" grpId="0"/>
+    </p:bldLst>
+  </p:timing>
+</p:sld>
+</file>
+
+<file path=ppt/slides/slide46.xml><?xml version="1.0" encoding="utf-8"?>
+<p:sld xmlns:a="http://schemas.openxmlformats.org/drawingml/2006/main" xmlns:r="http://schemas.openxmlformats.org/officeDocument/2006/relationships" xmlns:p="http://schemas.openxmlformats.org/presentationml/2006/main">
+  <p:cSld>
+    <p:spTree>
+      <p:nvGrpSpPr>
+        <p:cNvPr id="1" name=""/>
+        <p:cNvGrpSpPr/>
+        <p:nvPr/>
+      </p:nvGrpSpPr>
+      <p:grpSpPr>
+        <a:xfrm>
+          <a:off x="0" y="0"/>
+          <a:ext cx="0" cy="0"/>
+          <a:chOff x="0" y="0"/>
+          <a:chExt cx="0" cy="0"/>
+        </a:xfrm>
+      </p:grpSpPr>
+      <p:pic>
+        <p:nvPicPr>
+          <p:cNvPr id="8" name="Imagem 7"/>
+          <p:cNvPicPr>
+            <a:picLocks noChangeAspect="1"/>
+          </p:cNvPicPr>
+          <p:nvPr/>
+        </p:nvPicPr>
+        <p:blipFill>
+          <a:blip r:embed="rId2"/>
+          <a:stretch>
+            <a:fillRect/>
+          </a:stretch>
+        </p:blipFill>
+        <p:spPr>
+          <a:xfrm>
+            <a:off x="480725" y="2803023"/>
+            <a:ext cx="10609524" cy="2800000"/>
+          </a:xfrm>
+          <a:prstGeom prst="rect">
+            <a:avLst/>
+          </a:prstGeom>
+        </p:spPr>
+      </p:pic>
+      <p:sp>
+        <p:nvSpPr>
+          <p:cNvPr id="2" name="Título 1"/>
+          <p:cNvSpPr>
+            <a:spLocks noGrp="1"/>
+          </p:cNvSpPr>
+          <p:nvPr>
+            <p:ph type="title"/>
+          </p:nvPr>
+        </p:nvSpPr>
+        <p:spPr>
+          <a:xfrm>
+            <a:off x="480725" y="385591"/>
+            <a:ext cx="7914128" cy="685753"/>
+          </a:xfrm>
+        </p:spPr>
+        <p:txBody>
+          <a:bodyPr>
+            <a:normAutofit/>
+          </a:bodyPr>
+          <a:lstStyle/>
+          <a:p>
+            <a:r>
+              <a:rPr lang="pt-BR" sz="3200" dirty="0" smtClean="0">
+                <a:latin typeface="Consolas" panose="020B0609020204030204" pitchFamily="49" charset="0"/>
+              </a:rPr>
+              <a:t>Estrutura de repetição For</a:t>
+            </a:r>
+            <a:endParaRPr lang="pt-BR" sz="3200" dirty="0">
+              <a:latin typeface="Consolas" panose="020B0609020204030204" pitchFamily="49" charset="0"/>
+            </a:endParaRPr>
+          </a:p>
+        </p:txBody>
+      </p:sp>
+      <p:pic>
+        <p:nvPicPr>
+          <p:cNvPr id="4" name="Imagem 3"/>
+          <p:cNvPicPr>
+            <a:picLocks noChangeAspect="1"/>
+          </p:cNvPicPr>
+          <p:nvPr/>
+        </p:nvPicPr>
+        <p:blipFill>
+          <a:blip r:embed="rId3" cstate="print">
+            <a:extLst>
+              <a:ext uri="{28A0092B-C50C-407E-A947-70E740481C1C}">
+                <a14:useLocalDpi xmlns:a14="http://schemas.microsoft.com/office/drawing/2010/main" val="0"/>
+              </a:ext>
+            </a:extLst>
+          </a:blip>
+          <a:stretch>
+            <a:fillRect/>
+          </a:stretch>
+        </p:blipFill>
+        <p:spPr>
+          <a:xfrm>
+            <a:off x="10441211" y="110689"/>
+            <a:ext cx="1750789" cy="2157949"/>
+          </a:xfrm>
+          <a:prstGeom prst="rect">
+            <a:avLst/>
+          </a:prstGeom>
+        </p:spPr>
+      </p:pic>
+      <p:sp>
+        <p:nvSpPr>
+          <p:cNvPr id="5" name="CaixaDeTexto 4"/>
+          <p:cNvSpPr txBox="1"/>
+          <p:nvPr/>
+        </p:nvSpPr>
+        <p:spPr>
+          <a:xfrm>
+            <a:off x="8099610" y="4185984"/>
+            <a:ext cx="2210356" cy="954107"/>
+          </a:xfrm>
+          <a:prstGeom prst="rect">
+            <a:avLst/>
+          </a:prstGeom>
+          <a:noFill/>
+        </p:spPr>
+        <p:txBody>
+          <a:bodyPr wrap="square" rtlCol="0">
+            <a:spAutoFit/>
+          </a:bodyPr>
+          <a:lstStyle/>
+          <a:p>
+            <a:r>
+              <a:rPr lang="pt-BR" sz="2800" b="1" dirty="0" smtClean="0">
+                <a:latin typeface="Consolas" panose="020B0609020204030204" pitchFamily="49" charset="0"/>
+              </a:rPr>
+              <a:t>Imprime 1 na tela</a:t>
+            </a:r>
+            <a:endParaRPr lang="pt-BR" sz="2800" b="1" dirty="0">
+              <a:latin typeface="Consolas" panose="020B0609020204030204" pitchFamily="49" charset="0"/>
+            </a:endParaRPr>
+          </a:p>
+        </p:txBody>
+      </p:sp>
+      <p:cxnSp>
+        <p:nvCxnSpPr>
+          <p:cNvPr id="6" name="Conector de seta reta 5"/>
+          <p:cNvCxnSpPr/>
+          <p:nvPr/>
+        </p:nvCxnSpPr>
+        <p:spPr>
+          <a:xfrm>
+            <a:off x="6800204" y="4698206"/>
+            <a:ext cx="1223206" cy="7144"/>
+          </a:xfrm>
+          <a:prstGeom prst="straightConnector1">
+            <a:avLst/>
+          </a:prstGeom>
+          <a:ln w="38100">
+            <a:solidFill>
+              <a:schemeClr val="tx1"/>
+            </a:solidFill>
+            <a:tailEnd type="triangle"/>
+          </a:ln>
+        </p:spPr>
+        <p:style>
+          <a:lnRef idx="1">
+            <a:schemeClr val="accent1"/>
+          </a:lnRef>
+          <a:fillRef idx="0">
+            <a:schemeClr val="accent1"/>
+          </a:fillRef>
+          <a:effectRef idx="0">
+            <a:schemeClr val="accent1"/>
+          </a:effectRef>
+          <a:fontRef idx="minor">
+            <a:schemeClr val="tx1"/>
+          </a:fontRef>
+        </p:style>
+      </p:cxnSp>
+      <p:sp>
+        <p:nvSpPr>
+          <p:cNvPr id="16" name="Seta para baixo 15"/>
+          <p:cNvSpPr/>
+          <p:nvPr/>
+        </p:nvSpPr>
+        <p:spPr>
+          <a:xfrm rot="16200000">
+            <a:off x="1768241" y="4441625"/>
+            <a:ext cx="309243" cy="442827"/>
+          </a:xfrm>
+          <a:prstGeom prst="downArrow">
+            <a:avLst/>
+          </a:prstGeom>
+          <a:noFill/>
+          <a:ln w="38100">
+            <a:solidFill>
+              <a:schemeClr val="tx1"/>
+            </a:solidFill>
+          </a:ln>
+        </p:spPr>
+        <p:style>
+          <a:lnRef idx="2">
+            <a:schemeClr val="accent1">
+              <a:shade val="50000"/>
+            </a:schemeClr>
+          </a:lnRef>
+          <a:fillRef idx="1">
+            <a:schemeClr val="accent1"/>
+          </a:fillRef>
+          <a:effectRef idx="0">
+            <a:schemeClr val="accent1"/>
+          </a:effectRef>
+          <a:fontRef idx="minor">
+            <a:schemeClr val="lt1"/>
+          </a:fontRef>
+        </p:style>
+        <p:txBody>
+          <a:bodyPr rtlCol="0" anchor="ctr"/>
+          <a:lstStyle/>
+          <a:p>
+            <a:pPr algn="ctr"/>
+            <a:endParaRPr lang="pt-BR"/>
+          </a:p>
+        </p:txBody>
+      </p:sp>
+    </p:spTree>
+    <p:extLst>
+      <p:ext uri="{BB962C8B-B14F-4D97-AF65-F5344CB8AC3E}">
+        <p14:creationId xmlns:p14="http://schemas.microsoft.com/office/powerpoint/2010/main" val="1807804593"/>
+      </p:ext>
+    </p:extLst>
+  </p:cSld>
+  <p:clrMapOvr>
+    <a:masterClrMapping/>
+  </p:clrMapOvr>
+  <p:timing>
+    <p:tnLst>
+      <p:par>
+        <p:cTn id="1" dur="indefinite" restart="never" nodeType="tmRoot"/>
+      </p:par>
+    </p:tnLst>
+  </p:timing>
+</p:sld>
+</file>
+
+<file path=ppt/slides/slide47.xml><?xml version="1.0" encoding="utf-8"?>
+<p:sld xmlns:a="http://schemas.openxmlformats.org/drawingml/2006/main" xmlns:r="http://schemas.openxmlformats.org/officeDocument/2006/relationships" xmlns:p="http://schemas.openxmlformats.org/presentationml/2006/main">
+  <p:cSld>
+    <p:spTree>
+      <p:nvGrpSpPr>
+        <p:cNvPr id="1" name=""/>
+        <p:cNvGrpSpPr/>
+        <p:nvPr/>
+      </p:nvGrpSpPr>
+      <p:grpSpPr>
+        <a:xfrm>
+          <a:off x="0" y="0"/>
+          <a:ext cx="0" cy="0"/>
+          <a:chOff x="0" y="0"/>
+          <a:chExt cx="0" cy="0"/>
+        </a:xfrm>
+      </p:grpSpPr>
+      <p:pic>
+        <p:nvPicPr>
+          <p:cNvPr id="8" name="Imagem 7"/>
+          <p:cNvPicPr>
+            <a:picLocks noChangeAspect="1"/>
+          </p:cNvPicPr>
+          <p:nvPr/>
+        </p:nvPicPr>
+        <p:blipFill>
+          <a:blip r:embed="rId2"/>
+          <a:stretch>
+            <a:fillRect/>
+          </a:stretch>
+        </p:blipFill>
+        <p:spPr>
+          <a:xfrm>
+            <a:off x="480725" y="2803023"/>
+            <a:ext cx="10609524" cy="2800000"/>
+          </a:xfrm>
+          <a:prstGeom prst="rect">
+            <a:avLst/>
+          </a:prstGeom>
+        </p:spPr>
+      </p:pic>
+      <p:sp>
+        <p:nvSpPr>
+          <p:cNvPr id="2" name="Título 1"/>
+          <p:cNvSpPr>
+            <a:spLocks noGrp="1"/>
+          </p:cNvSpPr>
+          <p:nvPr>
+            <p:ph type="title"/>
+          </p:nvPr>
+        </p:nvSpPr>
+        <p:spPr>
+          <a:xfrm>
+            <a:off x="480725" y="385591"/>
+            <a:ext cx="7914128" cy="685753"/>
+          </a:xfrm>
+        </p:spPr>
+        <p:txBody>
+          <a:bodyPr>
+            <a:normAutofit/>
+          </a:bodyPr>
+          <a:lstStyle/>
+          <a:p>
+            <a:r>
+              <a:rPr lang="pt-BR" sz="3200" dirty="0" smtClean="0">
+                <a:latin typeface="Consolas" panose="020B0609020204030204" pitchFamily="49" charset="0"/>
+              </a:rPr>
+              <a:t>Estrutura de repetição For</a:t>
+            </a:r>
+            <a:endParaRPr lang="pt-BR" sz="3200" dirty="0">
+              <a:latin typeface="Consolas" panose="020B0609020204030204" pitchFamily="49" charset="0"/>
+            </a:endParaRPr>
+          </a:p>
+        </p:txBody>
+      </p:sp>
+      <p:pic>
+        <p:nvPicPr>
+          <p:cNvPr id="4" name="Imagem 3"/>
+          <p:cNvPicPr>
+            <a:picLocks noChangeAspect="1"/>
+          </p:cNvPicPr>
+          <p:nvPr/>
+        </p:nvPicPr>
+        <p:blipFill>
+          <a:blip r:embed="rId3" cstate="print">
+            <a:extLst>
+              <a:ext uri="{28A0092B-C50C-407E-A947-70E740481C1C}">
+                <a14:useLocalDpi xmlns:a14="http://schemas.microsoft.com/office/drawing/2010/main" val="0"/>
+              </a:ext>
+            </a:extLst>
+          </a:blip>
+          <a:stretch>
+            <a:fillRect/>
+          </a:stretch>
+        </p:blipFill>
+        <p:spPr>
+          <a:xfrm>
+            <a:off x="10441211" y="110689"/>
+            <a:ext cx="1750789" cy="2157949"/>
+          </a:xfrm>
+          <a:prstGeom prst="rect">
+            <a:avLst/>
+          </a:prstGeom>
+        </p:spPr>
+      </p:pic>
+      <p:sp>
+        <p:nvSpPr>
+          <p:cNvPr id="16" name="Seta para baixo 15"/>
+          <p:cNvSpPr/>
+          <p:nvPr/>
+        </p:nvSpPr>
+        <p:spPr>
+          <a:xfrm rot="16200000">
+            <a:off x="913219" y="3909362"/>
+            <a:ext cx="309243" cy="442827"/>
+          </a:xfrm>
+          <a:prstGeom prst="downArrow">
+            <a:avLst/>
+          </a:prstGeom>
+          <a:noFill/>
+          <a:ln w="38100">
+            <a:solidFill>
+              <a:schemeClr val="tx1"/>
+            </a:solidFill>
+          </a:ln>
+        </p:spPr>
+        <p:style>
+          <a:lnRef idx="2">
+            <a:schemeClr val="accent1">
+              <a:shade val="50000"/>
+            </a:schemeClr>
+          </a:lnRef>
+          <a:fillRef idx="1">
+            <a:schemeClr val="accent1"/>
+          </a:fillRef>
+          <a:effectRef idx="0">
+            <a:schemeClr val="accent1"/>
+          </a:effectRef>
+          <a:fontRef idx="minor">
+            <a:schemeClr val="lt1"/>
+          </a:fontRef>
+        </p:style>
+        <p:txBody>
+          <a:bodyPr rtlCol="0" anchor="ctr"/>
+          <a:lstStyle/>
+          <a:p>
+            <a:pPr algn="ctr"/>
+            <a:endParaRPr lang="pt-BR"/>
+          </a:p>
+        </p:txBody>
+      </p:sp>
+      <p:sp>
+        <p:nvSpPr>
+          <p:cNvPr id="17" name="CaixaDeTexto 16"/>
+          <p:cNvSpPr txBox="1"/>
+          <p:nvPr/>
+        </p:nvSpPr>
+        <p:spPr>
+          <a:xfrm>
+            <a:off x="7410226" y="1071344"/>
+            <a:ext cx="2046358" cy="1200329"/>
+          </a:xfrm>
+          <a:prstGeom prst="rect">
+            <a:avLst/>
+          </a:prstGeom>
+          <a:noFill/>
+        </p:spPr>
+        <p:txBody>
+          <a:bodyPr wrap="square" rtlCol="0">
+            <a:spAutoFit/>
+          </a:bodyPr>
+          <a:lstStyle/>
+          <a:p>
+            <a:r>
+              <a:rPr lang="pt-BR" sz="2400" b="1" dirty="0" smtClean="0">
+                <a:latin typeface="Consolas" panose="020B0609020204030204" pitchFamily="49" charset="0"/>
+              </a:rPr>
+              <a:t>Incrementa i, i passa valer 2</a:t>
+            </a:r>
+            <a:endParaRPr lang="pt-BR" sz="2400" b="1" dirty="0">
+              <a:latin typeface="Consolas" panose="020B0609020204030204" pitchFamily="49" charset="0"/>
+            </a:endParaRPr>
+          </a:p>
+        </p:txBody>
+      </p:sp>
+      <p:cxnSp>
+        <p:nvCxnSpPr>
+          <p:cNvPr id="18" name="Conector de seta reta 17"/>
+          <p:cNvCxnSpPr/>
+          <p:nvPr/>
+        </p:nvCxnSpPr>
+        <p:spPr>
+          <a:xfrm flipV="1">
+            <a:off x="6337300" y="2120900"/>
+            <a:ext cx="1072925" cy="1855255"/>
+          </a:xfrm>
+          <a:prstGeom prst="straightConnector1">
+            <a:avLst/>
+          </a:prstGeom>
+          <a:ln w="38100">
+            <a:solidFill>
+              <a:schemeClr val="tx1"/>
+            </a:solidFill>
+            <a:tailEnd type="triangle"/>
+          </a:ln>
+        </p:spPr>
+        <p:style>
+          <a:lnRef idx="1">
+            <a:schemeClr val="accent1"/>
+          </a:lnRef>
+          <a:fillRef idx="0">
+            <a:schemeClr val="accent1"/>
+          </a:fillRef>
+          <a:effectRef idx="0">
+            <a:schemeClr val="accent1"/>
+          </a:effectRef>
+          <a:fontRef idx="minor">
+            <a:schemeClr val="tx1"/>
+          </a:fontRef>
+        </p:style>
+      </p:cxnSp>
+    </p:spTree>
+    <p:extLst>
+      <p:ext uri="{BB962C8B-B14F-4D97-AF65-F5344CB8AC3E}">
+        <p14:creationId xmlns:p14="http://schemas.microsoft.com/office/powerpoint/2010/main" val="2862893038"/>
+      </p:ext>
+    </p:extLst>
+  </p:cSld>
+  <p:clrMapOvr>
+    <a:masterClrMapping/>
+  </p:clrMapOvr>
+  <p:timing>
+    <p:tnLst>
+      <p:par>
+        <p:cTn id="1" dur="indefinite" restart="never" nodeType="tmRoot"/>
+      </p:par>
+    </p:tnLst>
+  </p:timing>
+</p:sld>
+</file>
+
+<file path=ppt/slides/slide48.xml><?xml version="1.0" encoding="utf-8"?>
+<p:sld xmlns:a="http://schemas.openxmlformats.org/drawingml/2006/main" xmlns:r="http://schemas.openxmlformats.org/officeDocument/2006/relationships" xmlns:p="http://schemas.openxmlformats.org/presentationml/2006/main">
+  <p:cSld>
+    <p:spTree>
+      <p:nvGrpSpPr>
+        <p:cNvPr id="1" name=""/>
+        <p:cNvGrpSpPr/>
+        <p:nvPr/>
+      </p:nvGrpSpPr>
+      <p:grpSpPr>
+        <a:xfrm>
+          <a:off x="0" y="0"/>
+          <a:ext cx="0" cy="0"/>
+          <a:chOff x="0" y="0"/>
+          <a:chExt cx="0" cy="0"/>
+        </a:xfrm>
+      </p:grpSpPr>
+      <p:pic>
+        <p:nvPicPr>
+          <p:cNvPr id="8" name="Imagem 7"/>
+          <p:cNvPicPr>
+            <a:picLocks noChangeAspect="1"/>
+          </p:cNvPicPr>
+          <p:nvPr/>
+        </p:nvPicPr>
+        <p:blipFill>
+          <a:blip r:embed="rId2"/>
+          <a:stretch>
+            <a:fillRect/>
+          </a:stretch>
+        </p:blipFill>
+        <p:spPr>
+          <a:xfrm>
+            <a:off x="480725" y="2803023"/>
+            <a:ext cx="10609524" cy="2800000"/>
+          </a:xfrm>
+          <a:prstGeom prst="rect">
+            <a:avLst/>
+          </a:prstGeom>
+        </p:spPr>
+      </p:pic>
+      <p:sp>
+        <p:nvSpPr>
+          <p:cNvPr id="2" name="Título 1"/>
+          <p:cNvSpPr>
+            <a:spLocks noGrp="1"/>
+          </p:cNvSpPr>
+          <p:nvPr>
+            <p:ph type="title"/>
+          </p:nvPr>
+        </p:nvSpPr>
+        <p:spPr>
+          <a:xfrm>
+            <a:off x="480725" y="385591"/>
+            <a:ext cx="7914128" cy="685753"/>
+          </a:xfrm>
+        </p:spPr>
+        <p:txBody>
+          <a:bodyPr>
+            <a:normAutofit/>
+          </a:bodyPr>
+          <a:lstStyle/>
+          <a:p>
+            <a:r>
+              <a:rPr lang="pt-BR" sz="3200" dirty="0" smtClean="0">
+                <a:latin typeface="Consolas" panose="020B0609020204030204" pitchFamily="49" charset="0"/>
+              </a:rPr>
+              <a:t>Estrutura de repetição For</a:t>
+            </a:r>
+            <a:endParaRPr lang="pt-BR" sz="3200" dirty="0">
+              <a:latin typeface="Consolas" panose="020B0609020204030204" pitchFamily="49" charset="0"/>
+            </a:endParaRPr>
+          </a:p>
+        </p:txBody>
+      </p:sp>
+      <p:pic>
+        <p:nvPicPr>
+          <p:cNvPr id="4" name="Imagem 3"/>
+          <p:cNvPicPr>
+            <a:picLocks noChangeAspect="1"/>
+          </p:cNvPicPr>
+          <p:nvPr/>
+        </p:nvPicPr>
+        <p:blipFill>
+          <a:blip r:embed="rId3" cstate="print">
+            <a:extLst>
+              <a:ext uri="{28A0092B-C50C-407E-A947-70E740481C1C}">
+                <a14:useLocalDpi xmlns:a14="http://schemas.microsoft.com/office/drawing/2010/main" val="0"/>
+              </a:ext>
+            </a:extLst>
+          </a:blip>
+          <a:stretch>
+            <a:fillRect/>
+          </a:stretch>
+        </p:blipFill>
+        <p:spPr>
+          <a:xfrm>
+            <a:off x="10441211" y="110689"/>
+            <a:ext cx="1750789" cy="2157949"/>
+          </a:xfrm>
+          <a:prstGeom prst="rect">
+            <a:avLst/>
+          </a:prstGeom>
+        </p:spPr>
+      </p:pic>
+      <p:sp>
+        <p:nvSpPr>
+          <p:cNvPr id="5" name="CaixaDeTexto 4"/>
+          <p:cNvSpPr txBox="1"/>
+          <p:nvPr/>
+        </p:nvSpPr>
+        <p:spPr>
+          <a:xfrm>
+            <a:off x="1458316" y="1417862"/>
+            <a:ext cx="2540036" cy="461665"/>
+          </a:xfrm>
+          <a:prstGeom prst="rect">
+            <a:avLst/>
+          </a:prstGeom>
+          <a:noFill/>
+        </p:spPr>
+        <p:txBody>
+          <a:bodyPr wrap="square" rtlCol="0">
+            <a:spAutoFit/>
+          </a:bodyPr>
+          <a:lstStyle/>
+          <a:p>
+            <a:r>
+              <a:rPr lang="pt-BR" sz="2400" b="1" dirty="0" smtClean="0">
+                <a:latin typeface="Consolas" panose="020B0609020204030204" pitchFamily="49" charset="0"/>
+              </a:rPr>
+              <a:t>Agora i é 2</a:t>
+            </a:r>
+            <a:endParaRPr lang="pt-BR" sz="2400" b="1" dirty="0">
+              <a:latin typeface="Consolas" panose="020B0609020204030204" pitchFamily="49" charset="0"/>
+            </a:endParaRPr>
+          </a:p>
+        </p:txBody>
+      </p:sp>
+      <p:sp>
+        <p:nvSpPr>
+          <p:cNvPr id="16" name="Seta para baixo 15"/>
+          <p:cNvSpPr/>
+          <p:nvPr/>
+        </p:nvSpPr>
+        <p:spPr>
+          <a:xfrm rot="16200000">
+            <a:off x="913219" y="3909362"/>
+            <a:ext cx="309243" cy="442827"/>
+          </a:xfrm>
+          <a:prstGeom prst="downArrow">
+            <a:avLst/>
+          </a:prstGeom>
+          <a:noFill/>
+          <a:ln w="38100">
+            <a:solidFill>
+              <a:schemeClr val="tx1"/>
+            </a:solidFill>
+          </a:ln>
+        </p:spPr>
+        <p:style>
+          <a:lnRef idx="2">
+            <a:schemeClr val="accent1">
+              <a:shade val="50000"/>
+            </a:schemeClr>
+          </a:lnRef>
+          <a:fillRef idx="1">
+            <a:schemeClr val="accent1"/>
+          </a:fillRef>
+          <a:effectRef idx="0">
+            <a:schemeClr val="accent1"/>
+          </a:effectRef>
+          <a:fontRef idx="minor">
+            <a:schemeClr val="lt1"/>
+          </a:fontRef>
+        </p:style>
+        <p:txBody>
+          <a:bodyPr rtlCol="0" anchor="ctr"/>
+          <a:lstStyle/>
+          <a:p>
+            <a:pPr algn="ctr"/>
+            <a:endParaRPr lang="pt-BR"/>
+          </a:p>
+        </p:txBody>
+      </p:sp>
+      <p:sp>
+        <p:nvSpPr>
+          <p:cNvPr id="17" name="CaixaDeTexto 16"/>
+          <p:cNvSpPr txBox="1"/>
+          <p:nvPr/>
+        </p:nvSpPr>
+        <p:spPr>
+          <a:xfrm>
+            <a:off x="4768625" y="1417863"/>
+            <a:ext cx="4375375" cy="461665"/>
+          </a:xfrm>
+          <a:prstGeom prst="rect">
+            <a:avLst/>
+          </a:prstGeom>
+          <a:noFill/>
+        </p:spPr>
+        <p:txBody>
+          <a:bodyPr wrap="square" rtlCol="0">
+            <a:spAutoFit/>
+          </a:bodyPr>
+          <a:lstStyle/>
+          <a:p>
+            <a:r>
+              <a:rPr lang="pt-BR" sz="2400" b="1" dirty="0" smtClean="0">
+                <a:latin typeface="Consolas" panose="020B0609020204030204" pitchFamily="49" charset="0"/>
+              </a:rPr>
+              <a:t>Testa se i é menor que 4</a:t>
+            </a:r>
+            <a:endParaRPr lang="pt-BR" sz="2400" b="1" dirty="0">
+              <a:latin typeface="Consolas" panose="020B0609020204030204" pitchFamily="49" charset="0"/>
+            </a:endParaRPr>
+          </a:p>
+        </p:txBody>
+      </p:sp>
+      <p:cxnSp>
+        <p:nvCxnSpPr>
+          <p:cNvPr id="18" name="Conector de seta reta 17"/>
+          <p:cNvCxnSpPr/>
+          <p:nvPr/>
+        </p:nvCxnSpPr>
+        <p:spPr>
+          <a:xfrm flipV="1">
+            <a:off x="5216396" y="1896455"/>
+            <a:ext cx="1144233" cy="1788628"/>
+          </a:xfrm>
+          <a:prstGeom prst="straightConnector1">
+            <a:avLst/>
+          </a:prstGeom>
+          <a:ln w="38100">
+            <a:solidFill>
+              <a:schemeClr val="tx1"/>
+            </a:solidFill>
+            <a:tailEnd type="triangle"/>
+          </a:ln>
+        </p:spPr>
+        <p:style>
+          <a:lnRef idx="1">
+            <a:schemeClr val="accent1"/>
+          </a:lnRef>
+          <a:fillRef idx="0">
+            <a:schemeClr val="accent1"/>
+          </a:fillRef>
+          <a:effectRef idx="0">
+            <a:schemeClr val="accent1"/>
+          </a:effectRef>
+          <a:fontRef idx="minor">
+            <a:schemeClr val="tx1"/>
+          </a:fontRef>
+        </p:style>
+      </p:cxnSp>
+      <p:sp>
+        <p:nvSpPr>
+          <p:cNvPr id="22" name="CaixaDeTexto 21"/>
+          <p:cNvSpPr txBox="1"/>
+          <p:nvPr/>
+        </p:nvSpPr>
+        <p:spPr>
+          <a:xfrm>
+            <a:off x="7086600" y="2037805"/>
+            <a:ext cx="1390571" cy="461665"/>
+          </a:xfrm>
+          <a:prstGeom prst="rect">
+            <a:avLst/>
+          </a:prstGeom>
+          <a:noFill/>
+        </p:spPr>
+        <p:txBody>
+          <a:bodyPr wrap="square" rtlCol="0">
+            <a:spAutoFit/>
+          </a:bodyPr>
+          <a:lstStyle/>
+          <a:p>
+            <a:r>
+              <a:rPr lang="pt-BR" sz="2400" b="1" dirty="0" err="1" smtClean="0">
+                <a:solidFill>
+                  <a:srgbClr val="00FF00"/>
+                </a:solidFill>
+                <a:latin typeface="Consolas" panose="020B0609020204030204" pitchFamily="49" charset="0"/>
+              </a:rPr>
+              <a:t>true</a:t>
+            </a:r>
+            <a:endParaRPr lang="pt-BR" sz="2400" b="1" dirty="0">
+              <a:solidFill>
+                <a:srgbClr val="00FF00"/>
+              </a:solidFill>
+              <a:latin typeface="Consolas" panose="020B0609020204030204" pitchFamily="49" charset="0"/>
+            </a:endParaRPr>
+          </a:p>
+        </p:txBody>
+      </p:sp>
+      <p:cxnSp>
+        <p:nvCxnSpPr>
+          <p:cNvPr id="23" name="Conector de seta reta 22"/>
+          <p:cNvCxnSpPr/>
+          <p:nvPr/>
+        </p:nvCxnSpPr>
+        <p:spPr>
+          <a:xfrm flipV="1">
+            <a:off x="5448300" y="2329104"/>
+            <a:ext cx="1638300" cy="1355979"/>
+          </a:xfrm>
+          <a:prstGeom prst="straightConnector1">
+            <a:avLst/>
+          </a:prstGeom>
+          <a:ln w="38100">
+            <a:solidFill>
+              <a:srgbClr val="00FF00"/>
+            </a:solidFill>
+            <a:tailEnd type="triangle"/>
+          </a:ln>
+        </p:spPr>
+        <p:style>
+          <a:lnRef idx="1">
+            <a:schemeClr val="accent1"/>
+          </a:lnRef>
+          <a:fillRef idx="0">
+            <a:schemeClr val="accent1"/>
+          </a:fillRef>
+          <a:effectRef idx="0">
+            <a:schemeClr val="accent1"/>
+          </a:effectRef>
+          <a:fontRef idx="minor">
+            <a:schemeClr val="tx1"/>
+          </a:fontRef>
+        </p:style>
+      </p:cxnSp>
+      <p:cxnSp>
+        <p:nvCxnSpPr>
+          <p:cNvPr id="13" name="Conector de seta reta 12"/>
+          <p:cNvCxnSpPr/>
+          <p:nvPr/>
+        </p:nvCxnSpPr>
+        <p:spPr>
+          <a:xfrm>
+            <a:off x="3547903" y="1671750"/>
+            <a:ext cx="1176420" cy="0"/>
+          </a:xfrm>
+          <a:prstGeom prst="straightConnector1">
+            <a:avLst/>
+          </a:prstGeom>
+          <a:ln w="38100">
+            <a:solidFill>
+              <a:schemeClr val="tx1"/>
+            </a:solidFill>
+            <a:tailEnd type="triangle"/>
+          </a:ln>
+        </p:spPr>
+        <p:style>
+          <a:lnRef idx="1">
+            <a:schemeClr val="accent1"/>
+          </a:lnRef>
+          <a:fillRef idx="0">
+            <a:schemeClr val="accent1"/>
+          </a:fillRef>
+          <a:effectRef idx="0">
+            <a:schemeClr val="accent1"/>
+          </a:effectRef>
+          <a:fontRef idx="minor">
+            <a:schemeClr val="tx1"/>
+          </a:fontRef>
+        </p:style>
+      </p:cxnSp>
+    </p:spTree>
+    <p:extLst>
+      <p:ext uri="{BB962C8B-B14F-4D97-AF65-F5344CB8AC3E}">
+        <p14:creationId xmlns:p14="http://schemas.microsoft.com/office/powerpoint/2010/main" val="2549855434"/>
+      </p:ext>
+    </p:extLst>
+  </p:cSld>
+  <p:clrMapOvr>
+    <a:masterClrMapping/>
+  </p:clrMapOvr>
+  <p:timing>
+    <p:tnLst>
+      <p:par>
+        <p:cTn id="1" dur="indefinite" restart="never" nodeType="tmRoot">
+          <p:childTnLst>
+            <p:seq concurrent="1" nextAc="seek">
+              <p:cTn id="2" dur="indefinite" nodeType="mainSeq">
+                <p:childTnLst>
+                  <p:par>
+                    <p:cTn id="3" fill="hold">
+                      <p:stCondLst>
+                        <p:cond delay="indefinite"/>
+                      </p:stCondLst>
+                      <p:childTnLst>
+                        <p:par>
+                          <p:cTn id="4" fill="hold">
+                            <p:stCondLst>
+                              <p:cond delay="0"/>
+                            </p:stCondLst>
+                            <p:childTnLst>
+                              <p:par>
+                                <p:cTn id="5" presetID="10" presetClass="entr" presetSubtype="0" fill="hold" grpId="0" nodeType="clickEffect">
+                                  <p:stCondLst>
+                                    <p:cond delay="0"/>
+                                  </p:stCondLst>
+                                  <p:childTnLst>
+                                    <p:set>
+                                      <p:cBhvr>
+                                        <p:cTn id="6" dur="1" fill="hold">
+                                          <p:stCondLst>
+                                            <p:cond delay="0"/>
+                                          </p:stCondLst>
+                                        </p:cTn>
+                                        <p:tgtEl>
+                                          <p:spTgt spid="22"/>
+                                        </p:tgtEl>
+                                        <p:attrNameLst>
+                                          <p:attrName>style.visibility</p:attrName>
+                                        </p:attrNameLst>
+                                      </p:cBhvr>
+                                      <p:to>
+                                        <p:strVal val="visible"/>
+                                      </p:to>
+                                    </p:set>
+                                    <p:animEffect transition="in" filter="fade">
+                                      <p:cBhvr>
+                                        <p:cTn id="7" dur="500"/>
+                                        <p:tgtEl>
+                                          <p:spTgt spid="22"/>
+                                        </p:tgtEl>
+                                      </p:cBhvr>
+                                    </p:animEffect>
+                                  </p:childTnLst>
+                                </p:cTn>
+                              </p:par>
+                              <p:par>
+                                <p:cTn id="8" presetID="10" presetClass="entr" presetSubtype="0" fill="hold" nodeType="withEffect">
+                                  <p:stCondLst>
+                                    <p:cond delay="0"/>
+                                  </p:stCondLst>
+                                  <p:childTnLst>
+                                    <p:set>
+                                      <p:cBhvr>
+                                        <p:cTn id="9" dur="1" fill="hold">
+                                          <p:stCondLst>
+                                            <p:cond delay="0"/>
+                                          </p:stCondLst>
+                                        </p:cTn>
+                                        <p:tgtEl>
+                                          <p:spTgt spid="23"/>
+                                        </p:tgtEl>
+                                        <p:attrNameLst>
+                                          <p:attrName>style.visibility</p:attrName>
+                                        </p:attrNameLst>
+                                      </p:cBhvr>
+                                      <p:to>
+                                        <p:strVal val="visible"/>
+                                      </p:to>
+                                    </p:set>
+                                    <p:animEffect transition="in" filter="fade">
+                                      <p:cBhvr>
+                                        <p:cTn id="10" dur="500"/>
+                                        <p:tgtEl>
+                                          <p:spTgt spid="23"/>
+                                        </p:tgtEl>
+                                      </p:cBhvr>
+                                    </p:animEffect>
+                                  </p:childTnLst>
+                                </p:cTn>
+                              </p:par>
+                            </p:childTnLst>
+                          </p:cTn>
+                        </p:par>
+                      </p:childTnLst>
+                    </p:cTn>
+                  </p:par>
+                </p:childTnLst>
+              </p:cTn>
+              <p:prevCondLst>
+                <p:cond evt="onPrev" delay="0">
+                  <p:tgtEl>
+                    <p:sldTgt/>
+                  </p:tgtEl>
+                </p:cond>
+              </p:prevCondLst>
+              <p:nextCondLst>
+                <p:cond evt="onNext" delay="0">
+                  <p:tgtEl>
+                    <p:sldTgt/>
+                  </p:tgtEl>
+                </p:cond>
+              </p:nextCondLst>
+            </p:seq>
+          </p:childTnLst>
+        </p:cTn>
+      </p:par>
+    </p:tnLst>
+    <p:bldLst>
+      <p:bldP spid="22" grpId="0"/>
+    </p:bldLst>
+  </p:timing>
+</p:sld>
+</file>
+
+<file path=ppt/slides/slide49.xml><?xml version="1.0" encoding="utf-8"?>
+<p:sld xmlns:a="http://schemas.openxmlformats.org/drawingml/2006/main" xmlns:r="http://schemas.openxmlformats.org/officeDocument/2006/relationships" xmlns:p="http://schemas.openxmlformats.org/presentationml/2006/main">
+  <p:cSld>
+    <p:spTree>
+      <p:nvGrpSpPr>
+        <p:cNvPr id="1" name=""/>
+        <p:cNvGrpSpPr/>
+        <p:nvPr/>
+      </p:nvGrpSpPr>
+      <p:grpSpPr>
+        <a:xfrm>
+          <a:off x="0" y="0"/>
+          <a:ext cx="0" cy="0"/>
+          <a:chOff x="0" y="0"/>
+          <a:chExt cx="0" cy="0"/>
+        </a:xfrm>
+      </p:grpSpPr>
+      <p:pic>
+        <p:nvPicPr>
+          <p:cNvPr id="8" name="Imagem 7"/>
+          <p:cNvPicPr>
+            <a:picLocks noChangeAspect="1"/>
+          </p:cNvPicPr>
+          <p:nvPr/>
+        </p:nvPicPr>
+        <p:blipFill>
+          <a:blip r:embed="rId2"/>
+          <a:stretch>
+            <a:fillRect/>
+          </a:stretch>
+        </p:blipFill>
+        <p:spPr>
+          <a:xfrm>
+            <a:off x="480725" y="2803023"/>
+            <a:ext cx="10609524" cy="2800000"/>
+          </a:xfrm>
+          <a:prstGeom prst="rect">
+            <a:avLst/>
+          </a:prstGeom>
+        </p:spPr>
+      </p:pic>
+      <p:sp>
+        <p:nvSpPr>
+          <p:cNvPr id="2" name="Título 1"/>
+          <p:cNvSpPr>
+            <a:spLocks noGrp="1"/>
+          </p:cNvSpPr>
+          <p:nvPr>
+            <p:ph type="title"/>
+          </p:nvPr>
+        </p:nvSpPr>
+        <p:spPr>
+          <a:xfrm>
+            <a:off x="480725" y="385591"/>
+            <a:ext cx="7914128" cy="685753"/>
+          </a:xfrm>
+        </p:spPr>
+        <p:txBody>
+          <a:bodyPr>
+            <a:normAutofit/>
+          </a:bodyPr>
+          <a:lstStyle/>
+          <a:p>
+            <a:r>
+              <a:rPr lang="pt-BR" sz="3200" dirty="0" smtClean="0">
+                <a:latin typeface="Consolas" panose="020B0609020204030204" pitchFamily="49" charset="0"/>
+              </a:rPr>
+              <a:t>Estrutura de repetição For</a:t>
+            </a:r>
+            <a:endParaRPr lang="pt-BR" sz="3200" dirty="0">
+              <a:latin typeface="Consolas" panose="020B0609020204030204" pitchFamily="49" charset="0"/>
+            </a:endParaRPr>
+          </a:p>
+        </p:txBody>
+      </p:sp>
+      <p:pic>
+        <p:nvPicPr>
+          <p:cNvPr id="4" name="Imagem 3"/>
+          <p:cNvPicPr>
+            <a:picLocks noChangeAspect="1"/>
+          </p:cNvPicPr>
+          <p:nvPr/>
+        </p:nvPicPr>
+        <p:blipFill>
+          <a:blip r:embed="rId3" cstate="print">
+            <a:extLst>
+              <a:ext uri="{28A0092B-C50C-407E-A947-70E740481C1C}">
+                <a14:useLocalDpi xmlns:a14="http://schemas.microsoft.com/office/drawing/2010/main" val="0"/>
+              </a:ext>
+            </a:extLst>
+          </a:blip>
+          <a:stretch>
+            <a:fillRect/>
+          </a:stretch>
+        </p:blipFill>
+        <p:spPr>
+          <a:xfrm>
+            <a:off x="10441211" y="110689"/>
+            <a:ext cx="1750789" cy="2157949"/>
+          </a:xfrm>
+          <a:prstGeom prst="rect">
+            <a:avLst/>
+          </a:prstGeom>
+        </p:spPr>
+      </p:pic>
+      <p:sp>
+        <p:nvSpPr>
+          <p:cNvPr id="5" name="CaixaDeTexto 4"/>
+          <p:cNvSpPr txBox="1"/>
+          <p:nvPr/>
+        </p:nvSpPr>
+        <p:spPr>
+          <a:xfrm>
+            <a:off x="8099610" y="4185984"/>
+            <a:ext cx="2210356" cy="954107"/>
+          </a:xfrm>
+          <a:prstGeom prst="rect">
+            <a:avLst/>
+          </a:prstGeom>
+          <a:noFill/>
+        </p:spPr>
+        <p:txBody>
+          <a:bodyPr wrap="square" rtlCol="0">
+            <a:spAutoFit/>
+          </a:bodyPr>
+          <a:lstStyle/>
+          <a:p>
+            <a:r>
+              <a:rPr lang="pt-BR" sz="2800" b="1" dirty="0" smtClean="0">
+                <a:latin typeface="Consolas" panose="020B0609020204030204" pitchFamily="49" charset="0"/>
+              </a:rPr>
+              <a:t>Imprime 2 na tela</a:t>
+            </a:r>
+            <a:endParaRPr lang="pt-BR" sz="2800" b="1" dirty="0">
+              <a:latin typeface="Consolas" panose="020B0609020204030204" pitchFamily="49" charset="0"/>
+            </a:endParaRPr>
+          </a:p>
+        </p:txBody>
+      </p:sp>
+      <p:cxnSp>
+        <p:nvCxnSpPr>
+          <p:cNvPr id="6" name="Conector de seta reta 5"/>
+          <p:cNvCxnSpPr/>
+          <p:nvPr/>
+        </p:nvCxnSpPr>
+        <p:spPr>
+          <a:xfrm>
+            <a:off x="6800204" y="4698206"/>
+            <a:ext cx="1223206" cy="7144"/>
+          </a:xfrm>
+          <a:prstGeom prst="straightConnector1">
+            <a:avLst/>
+          </a:prstGeom>
+          <a:ln w="38100">
+            <a:solidFill>
+              <a:schemeClr val="tx1"/>
+            </a:solidFill>
+            <a:tailEnd type="triangle"/>
+          </a:ln>
+        </p:spPr>
+        <p:style>
+          <a:lnRef idx="1">
+            <a:schemeClr val="accent1"/>
+          </a:lnRef>
+          <a:fillRef idx="0">
+            <a:schemeClr val="accent1"/>
+          </a:fillRef>
+          <a:effectRef idx="0">
+            <a:schemeClr val="accent1"/>
+          </a:effectRef>
+          <a:fontRef idx="minor">
+            <a:schemeClr val="tx1"/>
+          </a:fontRef>
+        </p:style>
+      </p:cxnSp>
+      <p:sp>
+        <p:nvSpPr>
+          <p:cNvPr id="16" name="Seta para baixo 15"/>
+          <p:cNvSpPr/>
+          <p:nvPr/>
+        </p:nvSpPr>
+        <p:spPr>
+          <a:xfrm rot="16200000">
+            <a:off x="1768241" y="4441625"/>
+            <a:ext cx="309243" cy="442827"/>
+          </a:xfrm>
+          <a:prstGeom prst="downArrow">
+            <a:avLst/>
+          </a:prstGeom>
+          <a:noFill/>
+          <a:ln w="38100">
+            <a:solidFill>
+              <a:schemeClr val="tx1"/>
+            </a:solidFill>
+          </a:ln>
+        </p:spPr>
+        <p:style>
+          <a:lnRef idx="2">
+            <a:schemeClr val="accent1">
+              <a:shade val="50000"/>
+            </a:schemeClr>
+          </a:lnRef>
+          <a:fillRef idx="1">
+            <a:schemeClr val="accent1"/>
+          </a:fillRef>
+          <a:effectRef idx="0">
+            <a:schemeClr val="accent1"/>
+          </a:effectRef>
+          <a:fontRef idx="minor">
+            <a:schemeClr val="lt1"/>
+          </a:fontRef>
+        </p:style>
+        <p:txBody>
+          <a:bodyPr rtlCol="0" anchor="ctr"/>
+          <a:lstStyle/>
+          <a:p>
+            <a:pPr algn="ctr"/>
+            <a:endParaRPr lang="pt-BR"/>
+          </a:p>
+        </p:txBody>
+      </p:sp>
+    </p:spTree>
+    <p:extLst>
+      <p:ext uri="{BB962C8B-B14F-4D97-AF65-F5344CB8AC3E}">
+        <p14:creationId xmlns:p14="http://schemas.microsoft.com/office/powerpoint/2010/main" val="2663353457"/>
+      </p:ext>
+    </p:extLst>
+  </p:cSld>
+  <p:clrMapOvr>
+    <a:masterClrMapping/>
+  </p:clrMapOvr>
+  <p:timing>
+    <p:tnLst>
+      <p:par>
+        <p:cTn id="1" dur="indefinite" restart="never" nodeType="tmRoot"/>
+      </p:par>
+    </p:tnLst>
+  </p:timing>
+</p:sld>
+</file>
+
 <file path=ppt/slides/slide5.xml><?xml version="1.0" encoding="utf-8"?>
 <p:sld xmlns:a="http://schemas.openxmlformats.org/drawingml/2006/main" xmlns:r="http://schemas.openxmlformats.org/officeDocument/2006/relationships" xmlns:p="http://schemas.openxmlformats.org/presentationml/2006/main">
   <p:cSld>
@@ -33378,6 +36213,2031 @@
       <p:bldP spid="39" grpId="0" animBg="1"/>
       <p:bldP spid="41" grpId="0" animBg="1"/>
     </p:bldLst>
+  </p:timing>
+</p:sld>
+</file>
+
+<file path=ppt/slides/slide50.xml><?xml version="1.0" encoding="utf-8"?>
+<p:sld xmlns:a="http://schemas.openxmlformats.org/drawingml/2006/main" xmlns:r="http://schemas.openxmlformats.org/officeDocument/2006/relationships" xmlns:p="http://schemas.openxmlformats.org/presentationml/2006/main">
+  <p:cSld>
+    <p:spTree>
+      <p:nvGrpSpPr>
+        <p:cNvPr id="1" name=""/>
+        <p:cNvGrpSpPr/>
+        <p:nvPr/>
+      </p:nvGrpSpPr>
+      <p:grpSpPr>
+        <a:xfrm>
+          <a:off x="0" y="0"/>
+          <a:ext cx="0" cy="0"/>
+          <a:chOff x="0" y="0"/>
+          <a:chExt cx="0" cy="0"/>
+        </a:xfrm>
+      </p:grpSpPr>
+      <p:pic>
+        <p:nvPicPr>
+          <p:cNvPr id="8" name="Imagem 7"/>
+          <p:cNvPicPr>
+            <a:picLocks noChangeAspect="1"/>
+          </p:cNvPicPr>
+          <p:nvPr/>
+        </p:nvPicPr>
+        <p:blipFill>
+          <a:blip r:embed="rId2"/>
+          <a:stretch>
+            <a:fillRect/>
+          </a:stretch>
+        </p:blipFill>
+        <p:spPr>
+          <a:xfrm>
+            <a:off x="480725" y="2803023"/>
+            <a:ext cx="10609524" cy="2800000"/>
+          </a:xfrm>
+          <a:prstGeom prst="rect">
+            <a:avLst/>
+          </a:prstGeom>
+        </p:spPr>
+      </p:pic>
+      <p:sp>
+        <p:nvSpPr>
+          <p:cNvPr id="2" name="Título 1"/>
+          <p:cNvSpPr>
+            <a:spLocks noGrp="1"/>
+          </p:cNvSpPr>
+          <p:nvPr>
+            <p:ph type="title"/>
+          </p:nvPr>
+        </p:nvSpPr>
+        <p:spPr>
+          <a:xfrm>
+            <a:off x="480725" y="385591"/>
+            <a:ext cx="7914128" cy="685753"/>
+          </a:xfrm>
+        </p:spPr>
+        <p:txBody>
+          <a:bodyPr>
+            <a:normAutofit/>
+          </a:bodyPr>
+          <a:lstStyle/>
+          <a:p>
+            <a:r>
+              <a:rPr lang="pt-BR" sz="3200" dirty="0" smtClean="0">
+                <a:latin typeface="Consolas" panose="020B0609020204030204" pitchFamily="49" charset="0"/>
+              </a:rPr>
+              <a:t>Estrutura de repetição For</a:t>
+            </a:r>
+            <a:endParaRPr lang="pt-BR" sz="3200" dirty="0">
+              <a:latin typeface="Consolas" panose="020B0609020204030204" pitchFamily="49" charset="0"/>
+            </a:endParaRPr>
+          </a:p>
+        </p:txBody>
+      </p:sp>
+      <p:pic>
+        <p:nvPicPr>
+          <p:cNvPr id="4" name="Imagem 3"/>
+          <p:cNvPicPr>
+            <a:picLocks noChangeAspect="1"/>
+          </p:cNvPicPr>
+          <p:nvPr/>
+        </p:nvPicPr>
+        <p:blipFill>
+          <a:blip r:embed="rId3" cstate="print">
+            <a:extLst>
+              <a:ext uri="{28A0092B-C50C-407E-A947-70E740481C1C}">
+                <a14:useLocalDpi xmlns:a14="http://schemas.microsoft.com/office/drawing/2010/main" val="0"/>
+              </a:ext>
+            </a:extLst>
+          </a:blip>
+          <a:stretch>
+            <a:fillRect/>
+          </a:stretch>
+        </p:blipFill>
+        <p:spPr>
+          <a:xfrm>
+            <a:off x="10441211" y="110689"/>
+            <a:ext cx="1750789" cy="2157949"/>
+          </a:xfrm>
+          <a:prstGeom prst="rect">
+            <a:avLst/>
+          </a:prstGeom>
+        </p:spPr>
+      </p:pic>
+      <p:sp>
+        <p:nvSpPr>
+          <p:cNvPr id="16" name="Seta para baixo 15"/>
+          <p:cNvSpPr/>
+          <p:nvPr/>
+        </p:nvSpPr>
+        <p:spPr>
+          <a:xfrm rot="16200000">
+            <a:off x="913219" y="3909362"/>
+            <a:ext cx="309243" cy="442827"/>
+          </a:xfrm>
+          <a:prstGeom prst="downArrow">
+            <a:avLst/>
+          </a:prstGeom>
+          <a:noFill/>
+          <a:ln w="38100">
+            <a:solidFill>
+              <a:schemeClr val="tx1"/>
+            </a:solidFill>
+          </a:ln>
+        </p:spPr>
+        <p:style>
+          <a:lnRef idx="2">
+            <a:schemeClr val="accent1">
+              <a:shade val="50000"/>
+            </a:schemeClr>
+          </a:lnRef>
+          <a:fillRef idx="1">
+            <a:schemeClr val="accent1"/>
+          </a:fillRef>
+          <a:effectRef idx="0">
+            <a:schemeClr val="accent1"/>
+          </a:effectRef>
+          <a:fontRef idx="minor">
+            <a:schemeClr val="lt1"/>
+          </a:fontRef>
+        </p:style>
+        <p:txBody>
+          <a:bodyPr rtlCol="0" anchor="ctr"/>
+          <a:lstStyle/>
+          <a:p>
+            <a:pPr algn="ctr"/>
+            <a:endParaRPr lang="pt-BR"/>
+          </a:p>
+        </p:txBody>
+      </p:sp>
+      <p:sp>
+        <p:nvSpPr>
+          <p:cNvPr id="17" name="CaixaDeTexto 16"/>
+          <p:cNvSpPr txBox="1"/>
+          <p:nvPr/>
+        </p:nvSpPr>
+        <p:spPr>
+          <a:xfrm>
+            <a:off x="7410226" y="1071344"/>
+            <a:ext cx="2046358" cy="1200329"/>
+          </a:xfrm>
+          <a:prstGeom prst="rect">
+            <a:avLst/>
+          </a:prstGeom>
+          <a:noFill/>
+        </p:spPr>
+        <p:txBody>
+          <a:bodyPr wrap="square" rtlCol="0">
+            <a:spAutoFit/>
+          </a:bodyPr>
+          <a:lstStyle/>
+          <a:p>
+            <a:r>
+              <a:rPr lang="pt-BR" sz="2400" b="1" dirty="0" smtClean="0">
+                <a:latin typeface="Consolas" panose="020B0609020204030204" pitchFamily="49" charset="0"/>
+              </a:rPr>
+              <a:t>Incrementa i, i passa valer 3</a:t>
+            </a:r>
+            <a:endParaRPr lang="pt-BR" sz="2400" b="1" dirty="0">
+              <a:latin typeface="Consolas" panose="020B0609020204030204" pitchFamily="49" charset="0"/>
+            </a:endParaRPr>
+          </a:p>
+        </p:txBody>
+      </p:sp>
+      <p:cxnSp>
+        <p:nvCxnSpPr>
+          <p:cNvPr id="18" name="Conector de seta reta 17"/>
+          <p:cNvCxnSpPr/>
+          <p:nvPr/>
+        </p:nvCxnSpPr>
+        <p:spPr>
+          <a:xfrm flipV="1">
+            <a:off x="6337300" y="2120900"/>
+            <a:ext cx="1072925" cy="1855255"/>
+          </a:xfrm>
+          <a:prstGeom prst="straightConnector1">
+            <a:avLst/>
+          </a:prstGeom>
+          <a:ln w="38100">
+            <a:solidFill>
+              <a:schemeClr val="tx1"/>
+            </a:solidFill>
+            <a:tailEnd type="triangle"/>
+          </a:ln>
+        </p:spPr>
+        <p:style>
+          <a:lnRef idx="1">
+            <a:schemeClr val="accent1"/>
+          </a:lnRef>
+          <a:fillRef idx="0">
+            <a:schemeClr val="accent1"/>
+          </a:fillRef>
+          <a:effectRef idx="0">
+            <a:schemeClr val="accent1"/>
+          </a:effectRef>
+          <a:fontRef idx="minor">
+            <a:schemeClr val="tx1"/>
+          </a:fontRef>
+        </p:style>
+      </p:cxnSp>
+    </p:spTree>
+    <p:extLst>
+      <p:ext uri="{BB962C8B-B14F-4D97-AF65-F5344CB8AC3E}">
+        <p14:creationId xmlns:p14="http://schemas.microsoft.com/office/powerpoint/2010/main" val="746788858"/>
+      </p:ext>
+    </p:extLst>
+  </p:cSld>
+  <p:clrMapOvr>
+    <a:masterClrMapping/>
+  </p:clrMapOvr>
+  <p:timing>
+    <p:tnLst>
+      <p:par>
+        <p:cTn id="1" dur="indefinite" restart="never" nodeType="tmRoot"/>
+      </p:par>
+    </p:tnLst>
+  </p:timing>
+</p:sld>
+</file>
+
+<file path=ppt/slides/slide51.xml><?xml version="1.0" encoding="utf-8"?>
+<p:sld xmlns:a="http://schemas.openxmlformats.org/drawingml/2006/main" xmlns:r="http://schemas.openxmlformats.org/officeDocument/2006/relationships" xmlns:p="http://schemas.openxmlformats.org/presentationml/2006/main">
+  <p:cSld>
+    <p:spTree>
+      <p:nvGrpSpPr>
+        <p:cNvPr id="1" name=""/>
+        <p:cNvGrpSpPr/>
+        <p:nvPr/>
+      </p:nvGrpSpPr>
+      <p:grpSpPr>
+        <a:xfrm>
+          <a:off x="0" y="0"/>
+          <a:ext cx="0" cy="0"/>
+          <a:chOff x="0" y="0"/>
+          <a:chExt cx="0" cy="0"/>
+        </a:xfrm>
+      </p:grpSpPr>
+      <p:pic>
+        <p:nvPicPr>
+          <p:cNvPr id="8" name="Imagem 7"/>
+          <p:cNvPicPr>
+            <a:picLocks noChangeAspect="1"/>
+          </p:cNvPicPr>
+          <p:nvPr/>
+        </p:nvPicPr>
+        <p:blipFill>
+          <a:blip r:embed="rId2"/>
+          <a:stretch>
+            <a:fillRect/>
+          </a:stretch>
+        </p:blipFill>
+        <p:spPr>
+          <a:xfrm>
+            <a:off x="480725" y="2803023"/>
+            <a:ext cx="10609524" cy="2800000"/>
+          </a:xfrm>
+          <a:prstGeom prst="rect">
+            <a:avLst/>
+          </a:prstGeom>
+        </p:spPr>
+      </p:pic>
+      <p:sp>
+        <p:nvSpPr>
+          <p:cNvPr id="2" name="Título 1"/>
+          <p:cNvSpPr>
+            <a:spLocks noGrp="1"/>
+          </p:cNvSpPr>
+          <p:nvPr>
+            <p:ph type="title"/>
+          </p:nvPr>
+        </p:nvSpPr>
+        <p:spPr>
+          <a:xfrm>
+            <a:off x="480725" y="385591"/>
+            <a:ext cx="7914128" cy="685753"/>
+          </a:xfrm>
+        </p:spPr>
+        <p:txBody>
+          <a:bodyPr>
+            <a:normAutofit/>
+          </a:bodyPr>
+          <a:lstStyle/>
+          <a:p>
+            <a:r>
+              <a:rPr lang="pt-BR" sz="3200" dirty="0" smtClean="0">
+                <a:latin typeface="Consolas" panose="020B0609020204030204" pitchFamily="49" charset="0"/>
+              </a:rPr>
+              <a:t>Estrutura de repetição For</a:t>
+            </a:r>
+            <a:endParaRPr lang="pt-BR" sz="3200" dirty="0">
+              <a:latin typeface="Consolas" panose="020B0609020204030204" pitchFamily="49" charset="0"/>
+            </a:endParaRPr>
+          </a:p>
+        </p:txBody>
+      </p:sp>
+      <p:pic>
+        <p:nvPicPr>
+          <p:cNvPr id="4" name="Imagem 3"/>
+          <p:cNvPicPr>
+            <a:picLocks noChangeAspect="1"/>
+          </p:cNvPicPr>
+          <p:nvPr/>
+        </p:nvPicPr>
+        <p:blipFill>
+          <a:blip r:embed="rId3" cstate="print">
+            <a:extLst>
+              <a:ext uri="{28A0092B-C50C-407E-A947-70E740481C1C}">
+                <a14:useLocalDpi xmlns:a14="http://schemas.microsoft.com/office/drawing/2010/main" val="0"/>
+              </a:ext>
+            </a:extLst>
+          </a:blip>
+          <a:stretch>
+            <a:fillRect/>
+          </a:stretch>
+        </p:blipFill>
+        <p:spPr>
+          <a:xfrm>
+            <a:off x="10441211" y="110689"/>
+            <a:ext cx="1750789" cy="2157949"/>
+          </a:xfrm>
+          <a:prstGeom prst="rect">
+            <a:avLst/>
+          </a:prstGeom>
+        </p:spPr>
+      </p:pic>
+      <p:sp>
+        <p:nvSpPr>
+          <p:cNvPr id="5" name="CaixaDeTexto 4"/>
+          <p:cNvSpPr txBox="1"/>
+          <p:nvPr/>
+        </p:nvSpPr>
+        <p:spPr>
+          <a:xfrm>
+            <a:off x="1458316" y="1417862"/>
+            <a:ext cx="2540036" cy="461665"/>
+          </a:xfrm>
+          <a:prstGeom prst="rect">
+            <a:avLst/>
+          </a:prstGeom>
+          <a:noFill/>
+        </p:spPr>
+        <p:txBody>
+          <a:bodyPr wrap="square" rtlCol="0">
+            <a:spAutoFit/>
+          </a:bodyPr>
+          <a:lstStyle/>
+          <a:p>
+            <a:r>
+              <a:rPr lang="pt-BR" sz="2400" b="1" dirty="0" smtClean="0">
+                <a:latin typeface="Consolas" panose="020B0609020204030204" pitchFamily="49" charset="0"/>
+              </a:rPr>
+              <a:t>Agora i é 3</a:t>
+            </a:r>
+            <a:endParaRPr lang="pt-BR" sz="2400" b="1" dirty="0">
+              <a:latin typeface="Consolas" panose="020B0609020204030204" pitchFamily="49" charset="0"/>
+            </a:endParaRPr>
+          </a:p>
+        </p:txBody>
+      </p:sp>
+      <p:sp>
+        <p:nvSpPr>
+          <p:cNvPr id="16" name="Seta para baixo 15"/>
+          <p:cNvSpPr/>
+          <p:nvPr/>
+        </p:nvSpPr>
+        <p:spPr>
+          <a:xfrm rot="16200000">
+            <a:off x="913219" y="3909362"/>
+            <a:ext cx="309243" cy="442827"/>
+          </a:xfrm>
+          <a:prstGeom prst="downArrow">
+            <a:avLst/>
+          </a:prstGeom>
+          <a:noFill/>
+          <a:ln w="38100">
+            <a:solidFill>
+              <a:schemeClr val="tx1"/>
+            </a:solidFill>
+          </a:ln>
+        </p:spPr>
+        <p:style>
+          <a:lnRef idx="2">
+            <a:schemeClr val="accent1">
+              <a:shade val="50000"/>
+            </a:schemeClr>
+          </a:lnRef>
+          <a:fillRef idx="1">
+            <a:schemeClr val="accent1"/>
+          </a:fillRef>
+          <a:effectRef idx="0">
+            <a:schemeClr val="accent1"/>
+          </a:effectRef>
+          <a:fontRef idx="minor">
+            <a:schemeClr val="lt1"/>
+          </a:fontRef>
+        </p:style>
+        <p:txBody>
+          <a:bodyPr rtlCol="0" anchor="ctr"/>
+          <a:lstStyle/>
+          <a:p>
+            <a:pPr algn="ctr"/>
+            <a:endParaRPr lang="pt-BR"/>
+          </a:p>
+        </p:txBody>
+      </p:sp>
+      <p:sp>
+        <p:nvSpPr>
+          <p:cNvPr id="17" name="CaixaDeTexto 16"/>
+          <p:cNvSpPr txBox="1"/>
+          <p:nvPr/>
+        </p:nvSpPr>
+        <p:spPr>
+          <a:xfrm>
+            <a:off x="4768625" y="1417863"/>
+            <a:ext cx="4375375" cy="461665"/>
+          </a:xfrm>
+          <a:prstGeom prst="rect">
+            <a:avLst/>
+          </a:prstGeom>
+          <a:noFill/>
+        </p:spPr>
+        <p:txBody>
+          <a:bodyPr wrap="square" rtlCol="0">
+            <a:spAutoFit/>
+          </a:bodyPr>
+          <a:lstStyle/>
+          <a:p>
+            <a:r>
+              <a:rPr lang="pt-BR" sz="2400" b="1" dirty="0" smtClean="0">
+                <a:latin typeface="Consolas" panose="020B0609020204030204" pitchFamily="49" charset="0"/>
+              </a:rPr>
+              <a:t>Testa se i é menor que 4</a:t>
+            </a:r>
+            <a:endParaRPr lang="pt-BR" sz="2400" b="1" dirty="0">
+              <a:latin typeface="Consolas" panose="020B0609020204030204" pitchFamily="49" charset="0"/>
+            </a:endParaRPr>
+          </a:p>
+        </p:txBody>
+      </p:sp>
+      <p:cxnSp>
+        <p:nvCxnSpPr>
+          <p:cNvPr id="18" name="Conector de seta reta 17"/>
+          <p:cNvCxnSpPr/>
+          <p:nvPr/>
+        </p:nvCxnSpPr>
+        <p:spPr>
+          <a:xfrm flipV="1">
+            <a:off x="5216396" y="1896455"/>
+            <a:ext cx="1144233" cy="1788628"/>
+          </a:xfrm>
+          <a:prstGeom prst="straightConnector1">
+            <a:avLst/>
+          </a:prstGeom>
+          <a:ln w="38100">
+            <a:solidFill>
+              <a:schemeClr val="tx1"/>
+            </a:solidFill>
+            <a:tailEnd type="triangle"/>
+          </a:ln>
+        </p:spPr>
+        <p:style>
+          <a:lnRef idx="1">
+            <a:schemeClr val="accent1"/>
+          </a:lnRef>
+          <a:fillRef idx="0">
+            <a:schemeClr val="accent1"/>
+          </a:fillRef>
+          <a:effectRef idx="0">
+            <a:schemeClr val="accent1"/>
+          </a:effectRef>
+          <a:fontRef idx="minor">
+            <a:schemeClr val="tx1"/>
+          </a:fontRef>
+        </p:style>
+      </p:cxnSp>
+      <p:sp>
+        <p:nvSpPr>
+          <p:cNvPr id="22" name="CaixaDeTexto 21"/>
+          <p:cNvSpPr txBox="1"/>
+          <p:nvPr/>
+        </p:nvSpPr>
+        <p:spPr>
+          <a:xfrm>
+            <a:off x="7086600" y="2037805"/>
+            <a:ext cx="1390571" cy="461665"/>
+          </a:xfrm>
+          <a:prstGeom prst="rect">
+            <a:avLst/>
+          </a:prstGeom>
+          <a:noFill/>
+        </p:spPr>
+        <p:txBody>
+          <a:bodyPr wrap="square" rtlCol="0">
+            <a:spAutoFit/>
+          </a:bodyPr>
+          <a:lstStyle/>
+          <a:p>
+            <a:r>
+              <a:rPr lang="pt-BR" sz="2400" b="1" dirty="0" err="1" smtClean="0">
+                <a:solidFill>
+                  <a:srgbClr val="00FF00"/>
+                </a:solidFill>
+                <a:latin typeface="Consolas" panose="020B0609020204030204" pitchFamily="49" charset="0"/>
+              </a:rPr>
+              <a:t>true</a:t>
+            </a:r>
+            <a:endParaRPr lang="pt-BR" sz="2400" b="1" dirty="0">
+              <a:solidFill>
+                <a:srgbClr val="00FF00"/>
+              </a:solidFill>
+              <a:latin typeface="Consolas" panose="020B0609020204030204" pitchFamily="49" charset="0"/>
+            </a:endParaRPr>
+          </a:p>
+        </p:txBody>
+      </p:sp>
+      <p:cxnSp>
+        <p:nvCxnSpPr>
+          <p:cNvPr id="23" name="Conector de seta reta 22"/>
+          <p:cNvCxnSpPr/>
+          <p:nvPr/>
+        </p:nvCxnSpPr>
+        <p:spPr>
+          <a:xfrm flipV="1">
+            <a:off x="5448300" y="2329104"/>
+            <a:ext cx="1638300" cy="1355979"/>
+          </a:xfrm>
+          <a:prstGeom prst="straightConnector1">
+            <a:avLst/>
+          </a:prstGeom>
+          <a:ln w="38100">
+            <a:solidFill>
+              <a:srgbClr val="00FF00"/>
+            </a:solidFill>
+            <a:tailEnd type="triangle"/>
+          </a:ln>
+        </p:spPr>
+        <p:style>
+          <a:lnRef idx="1">
+            <a:schemeClr val="accent1"/>
+          </a:lnRef>
+          <a:fillRef idx="0">
+            <a:schemeClr val="accent1"/>
+          </a:fillRef>
+          <a:effectRef idx="0">
+            <a:schemeClr val="accent1"/>
+          </a:effectRef>
+          <a:fontRef idx="minor">
+            <a:schemeClr val="tx1"/>
+          </a:fontRef>
+        </p:style>
+      </p:cxnSp>
+      <p:cxnSp>
+        <p:nvCxnSpPr>
+          <p:cNvPr id="13" name="Conector de seta reta 12"/>
+          <p:cNvCxnSpPr/>
+          <p:nvPr/>
+        </p:nvCxnSpPr>
+        <p:spPr>
+          <a:xfrm>
+            <a:off x="3547903" y="1671750"/>
+            <a:ext cx="1176420" cy="0"/>
+          </a:xfrm>
+          <a:prstGeom prst="straightConnector1">
+            <a:avLst/>
+          </a:prstGeom>
+          <a:ln w="38100">
+            <a:solidFill>
+              <a:schemeClr val="tx1"/>
+            </a:solidFill>
+            <a:tailEnd type="triangle"/>
+          </a:ln>
+        </p:spPr>
+        <p:style>
+          <a:lnRef idx="1">
+            <a:schemeClr val="accent1"/>
+          </a:lnRef>
+          <a:fillRef idx="0">
+            <a:schemeClr val="accent1"/>
+          </a:fillRef>
+          <a:effectRef idx="0">
+            <a:schemeClr val="accent1"/>
+          </a:effectRef>
+          <a:fontRef idx="minor">
+            <a:schemeClr val="tx1"/>
+          </a:fontRef>
+        </p:style>
+      </p:cxnSp>
+    </p:spTree>
+    <p:extLst>
+      <p:ext uri="{BB962C8B-B14F-4D97-AF65-F5344CB8AC3E}">
+        <p14:creationId xmlns:p14="http://schemas.microsoft.com/office/powerpoint/2010/main" val="4131552140"/>
+      </p:ext>
+    </p:extLst>
+  </p:cSld>
+  <p:clrMapOvr>
+    <a:masterClrMapping/>
+  </p:clrMapOvr>
+  <p:timing>
+    <p:tnLst>
+      <p:par>
+        <p:cTn id="1" dur="indefinite" restart="never" nodeType="tmRoot">
+          <p:childTnLst>
+            <p:seq concurrent="1" nextAc="seek">
+              <p:cTn id="2" dur="indefinite" nodeType="mainSeq">
+                <p:childTnLst>
+                  <p:par>
+                    <p:cTn id="3" fill="hold">
+                      <p:stCondLst>
+                        <p:cond delay="indefinite"/>
+                      </p:stCondLst>
+                      <p:childTnLst>
+                        <p:par>
+                          <p:cTn id="4" fill="hold">
+                            <p:stCondLst>
+                              <p:cond delay="0"/>
+                            </p:stCondLst>
+                            <p:childTnLst>
+                              <p:par>
+                                <p:cTn id="5" presetID="10" presetClass="entr" presetSubtype="0" fill="hold" grpId="0" nodeType="clickEffect">
+                                  <p:stCondLst>
+                                    <p:cond delay="0"/>
+                                  </p:stCondLst>
+                                  <p:childTnLst>
+                                    <p:set>
+                                      <p:cBhvr>
+                                        <p:cTn id="6" dur="1" fill="hold">
+                                          <p:stCondLst>
+                                            <p:cond delay="0"/>
+                                          </p:stCondLst>
+                                        </p:cTn>
+                                        <p:tgtEl>
+                                          <p:spTgt spid="22"/>
+                                        </p:tgtEl>
+                                        <p:attrNameLst>
+                                          <p:attrName>style.visibility</p:attrName>
+                                        </p:attrNameLst>
+                                      </p:cBhvr>
+                                      <p:to>
+                                        <p:strVal val="visible"/>
+                                      </p:to>
+                                    </p:set>
+                                    <p:animEffect transition="in" filter="fade">
+                                      <p:cBhvr>
+                                        <p:cTn id="7" dur="500"/>
+                                        <p:tgtEl>
+                                          <p:spTgt spid="22"/>
+                                        </p:tgtEl>
+                                      </p:cBhvr>
+                                    </p:animEffect>
+                                  </p:childTnLst>
+                                </p:cTn>
+                              </p:par>
+                              <p:par>
+                                <p:cTn id="8" presetID="10" presetClass="entr" presetSubtype="0" fill="hold" nodeType="withEffect">
+                                  <p:stCondLst>
+                                    <p:cond delay="0"/>
+                                  </p:stCondLst>
+                                  <p:childTnLst>
+                                    <p:set>
+                                      <p:cBhvr>
+                                        <p:cTn id="9" dur="1" fill="hold">
+                                          <p:stCondLst>
+                                            <p:cond delay="0"/>
+                                          </p:stCondLst>
+                                        </p:cTn>
+                                        <p:tgtEl>
+                                          <p:spTgt spid="23"/>
+                                        </p:tgtEl>
+                                        <p:attrNameLst>
+                                          <p:attrName>style.visibility</p:attrName>
+                                        </p:attrNameLst>
+                                      </p:cBhvr>
+                                      <p:to>
+                                        <p:strVal val="visible"/>
+                                      </p:to>
+                                    </p:set>
+                                    <p:animEffect transition="in" filter="fade">
+                                      <p:cBhvr>
+                                        <p:cTn id="10" dur="500"/>
+                                        <p:tgtEl>
+                                          <p:spTgt spid="23"/>
+                                        </p:tgtEl>
+                                      </p:cBhvr>
+                                    </p:animEffect>
+                                  </p:childTnLst>
+                                </p:cTn>
+                              </p:par>
+                            </p:childTnLst>
+                          </p:cTn>
+                        </p:par>
+                      </p:childTnLst>
+                    </p:cTn>
+                  </p:par>
+                </p:childTnLst>
+              </p:cTn>
+              <p:prevCondLst>
+                <p:cond evt="onPrev" delay="0">
+                  <p:tgtEl>
+                    <p:sldTgt/>
+                  </p:tgtEl>
+                </p:cond>
+              </p:prevCondLst>
+              <p:nextCondLst>
+                <p:cond evt="onNext" delay="0">
+                  <p:tgtEl>
+                    <p:sldTgt/>
+                  </p:tgtEl>
+                </p:cond>
+              </p:nextCondLst>
+            </p:seq>
+          </p:childTnLst>
+        </p:cTn>
+      </p:par>
+    </p:tnLst>
+    <p:bldLst>
+      <p:bldP spid="22" grpId="0"/>
+    </p:bldLst>
+  </p:timing>
+</p:sld>
+</file>
+
+<file path=ppt/slides/slide52.xml><?xml version="1.0" encoding="utf-8"?>
+<p:sld xmlns:a="http://schemas.openxmlformats.org/drawingml/2006/main" xmlns:r="http://schemas.openxmlformats.org/officeDocument/2006/relationships" xmlns:p="http://schemas.openxmlformats.org/presentationml/2006/main">
+  <p:cSld>
+    <p:spTree>
+      <p:nvGrpSpPr>
+        <p:cNvPr id="1" name=""/>
+        <p:cNvGrpSpPr/>
+        <p:nvPr/>
+      </p:nvGrpSpPr>
+      <p:grpSpPr>
+        <a:xfrm>
+          <a:off x="0" y="0"/>
+          <a:ext cx="0" cy="0"/>
+          <a:chOff x="0" y="0"/>
+          <a:chExt cx="0" cy="0"/>
+        </a:xfrm>
+      </p:grpSpPr>
+      <p:pic>
+        <p:nvPicPr>
+          <p:cNvPr id="8" name="Imagem 7"/>
+          <p:cNvPicPr>
+            <a:picLocks noChangeAspect="1"/>
+          </p:cNvPicPr>
+          <p:nvPr/>
+        </p:nvPicPr>
+        <p:blipFill>
+          <a:blip r:embed="rId2"/>
+          <a:stretch>
+            <a:fillRect/>
+          </a:stretch>
+        </p:blipFill>
+        <p:spPr>
+          <a:xfrm>
+            <a:off x="480725" y="2803023"/>
+            <a:ext cx="10609524" cy="2800000"/>
+          </a:xfrm>
+          <a:prstGeom prst="rect">
+            <a:avLst/>
+          </a:prstGeom>
+        </p:spPr>
+      </p:pic>
+      <p:sp>
+        <p:nvSpPr>
+          <p:cNvPr id="2" name="Título 1"/>
+          <p:cNvSpPr>
+            <a:spLocks noGrp="1"/>
+          </p:cNvSpPr>
+          <p:nvPr>
+            <p:ph type="title"/>
+          </p:nvPr>
+        </p:nvSpPr>
+        <p:spPr>
+          <a:xfrm>
+            <a:off x="480725" y="385591"/>
+            <a:ext cx="7914128" cy="685753"/>
+          </a:xfrm>
+        </p:spPr>
+        <p:txBody>
+          <a:bodyPr>
+            <a:normAutofit/>
+          </a:bodyPr>
+          <a:lstStyle/>
+          <a:p>
+            <a:r>
+              <a:rPr lang="pt-BR" sz="3200" dirty="0" smtClean="0">
+                <a:latin typeface="Consolas" panose="020B0609020204030204" pitchFamily="49" charset="0"/>
+              </a:rPr>
+              <a:t>Estrutura de repetição For</a:t>
+            </a:r>
+            <a:endParaRPr lang="pt-BR" sz="3200" dirty="0">
+              <a:latin typeface="Consolas" panose="020B0609020204030204" pitchFamily="49" charset="0"/>
+            </a:endParaRPr>
+          </a:p>
+        </p:txBody>
+      </p:sp>
+      <p:pic>
+        <p:nvPicPr>
+          <p:cNvPr id="4" name="Imagem 3"/>
+          <p:cNvPicPr>
+            <a:picLocks noChangeAspect="1"/>
+          </p:cNvPicPr>
+          <p:nvPr/>
+        </p:nvPicPr>
+        <p:blipFill>
+          <a:blip r:embed="rId3" cstate="print">
+            <a:extLst>
+              <a:ext uri="{28A0092B-C50C-407E-A947-70E740481C1C}">
+                <a14:useLocalDpi xmlns:a14="http://schemas.microsoft.com/office/drawing/2010/main" val="0"/>
+              </a:ext>
+            </a:extLst>
+          </a:blip>
+          <a:stretch>
+            <a:fillRect/>
+          </a:stretch>
+        </p:blipFill>
+        <p:spPr>
+          <a:xfrm>
+            <a:off x="10441211" y="110689"/>
+            <a:ext cx="1750789" cy="2157949"/>
+          </a:xfrm>
+          <a:prstGeom prst="rect">
+            <a:avLst/>
+          </a:prstGeom>
+        </p:spPr>
+      </p:pic>
+      <p:sp>
+        <p:nvSpPr>
+          <p:cNvPr id="5" name="CaixaDeTexto 4"/>
+          <p:cNvSpPr txBox="1"/>
+          <p:nvPr/>
+        </p:nvSpPr>
+        <p:spPr>
+          <a:xfrm>
+            <a:off x="8099610" y="4185984"/>
+            <a:ext cx="2210356" cy="954107"/>
+          </a:xfrm>
+          <a:prstGeom prst="rect">
+            <a:avLst/>
+          </a:prstGeom>
+          <a:noFill/>
+        </p:spPr>
+        <p:txBody>
+          <a:bodyPr wrap="square" rtlCol="0">
+            <a:spAutoFit/>
+          </a:bodyPr>
+          <a:lstStyle/>
+          <a:p>
+            <a:r>
+              <a:rPr lang="pt-BR" sz="2800" b="1" dirty="0" smtClean="0">
+                <a:latin typeface="Consolas" panose="020B0609020204030204" pitchFamily="49" charset="0"/>
+              </a:rPr>
+              <a:t>Imprime 3 na tela</a:t>
+            </a:r>
+            <a:endParaRPr lang="pt-BR" sz="2800" b="1" dirty="0">
+              <a:latin typeface="Consolas" panose="020B0609020204030204" pitchFamily="49" charset="0"/>
+            </a:endParaRPr>
+          </a:p>
+        </p:txBody>
+      </p:sp>
+      <p:cxnSp>
+        <p:nvCxnSpPr>
+          <p:cNvPr id="6" name="Conector de seta reta 5"/>
+          <p:cNvCxnSpPr/>
+          <p:nvPr/>
+        </p:nvCxnSpPr>
+        <p:spPr>
+          <a:xfrm>
+            <a:off x="6800204" y="4698206"/>
+            <a:ext cx="1223206" cy="7144"/>
+          </a:xfrm>
+          <a:prstGeom prst="straightConnector1">
+            <a:avLst/>
+          </a:prstGeom>
+          <a:ln w="38100">
+            <a:solidFill>
+              <a:schemeClr val="tx1"/>
+            </a:solidFill>
+            <a:tailEnd type="triangle"/>
+          </a:ln>
+        </p:spPr>
+        <p:style>
+          <a:lnRef idx="1">
+            <a:schemeClr val="accent1"/>
+          </a:lnRef>
+          <a:fillRef idx="0">
+            <a:schemeClr val="accent1"/>
+          </a:fillRef>
+          <a:effectRef idx="0">
+            <a:schemeClr val="accent1"/>
+          </a:effectRef>
+          <a:fontRef idx="minor">
+            <a:schemeClr val="tx1"/>
+          </a:fontRef>
+        </p:style>
+      </p:cxnSp>
+      <p:sp>
+        <p:nvSpPr>
+          <p:cNvPr id="16" name="Seta para baixo 15"/>
+          <p:cNvSpPr/>
+          <p:nvPr/>
+        </p:nvSpPr>
+        <p:spPr>
+          <a:xfrm rot="16200000">
+            <a:off x="1768241" y="4441625"/>
+            <a:ext cx="309243" cy="442827"/>
+          </a:xfrm>
+          <a:prstGeom prst="downArrow">
+            <a:avLst/>
+          </a:prstGeom>
+          <a:noFill/>
+          <a:ln w="38100">
+            <a:solidFill>
+              <a:schemeClr val="tx1"/>
+            </a:solidFill>
+          </a:ln>
+        </p:spPr>
+        <p:style>
+          <a:lnRef idx="2">
+            <a:schemeClr val="accent1">
+              <a:shade val="50000"/>
+            </a:schemeClr>
+          </a:lnRef>
+          <a:fillRef idx="1">
+            <a:schemeClr val="accent1"/>
+          </a:fillRef>
+          <a:effectRef idx="0">
+            <a:schemeClr val="accent1"/>
+          </a:effectRef>
+          <a:fontRef idx="minor">
+            <a:schemeClr val="lt1"/>
+          </a:fontRef>
+        </p:style>
+        <p:txBody>
+          <a:bodyPr rtlCol="0" anchor="ctr"/>
+          <a:lstStyle/>
+          <a:p>
+            <a:pPr algn="ctr"/>
+            <a:endParaRPr lang="pt-BR"/>
+          </a:p>
+        </p:txBody>
+      </p:sp>
+    </p:spTree>
+    <p:extLst>
+      <p:ext uri="{BB962C8B-B14F-4D97-AF65-F5344CB8AC3E}">
+        <p14:creationId xmlns:p14="http://schemas.microsoft.com/office/powerpoint/2010/main" val="1162089182"/>
+      </p:ext>
+    </p:extLst>
+  </p:cSld>
+  <p:clrMapOvr>
+    <a:masterClrMapping/>
+  </p:clrMapOvr>
+  <p:timing>
+    <p:tnLst>
+      <p:par>
+        <p:cTn id="1" dur="indefinite" restart="never" nodeType="tmRoot"/>
+      </p:par>
+    </p:tnLst>
+  </p:timing>
+</p:sld>
+</file>
+
+<file path=ppt/slides/slide53.xml><?xml version="1.0" encoding="utf-8"?>
+<p:sld xmlns:a="http://schemas.openxmlformats.org/drawingml/2006/main" xmlns:r="http://schemas.openxmlformats.org/officeDocument/2006/relationships" xmlns:p="http://schemas.openxmlformats.org/presentationml/2006/main">
+  <p:cSld>
+    <p:spTree>
+      <p:nvGrpSpPr>
+        <p:cNvPr id="1" name=""/>
+        <p:cNvGrpSpPr/>
+        <p:nvPr/>
+      </p:nvGrpSpPr>
+      <p:grpSpPr>
+        <a:xfrm>
+          <a:off x="0" y="0"/>
+          <a:ext cx="0" cy="0"/>
+          <a:chOff x="0" y="0"/>
+          <a:chExt cx="0" cy="0"/>
+        </a:xfrm>
+      </p:grpSpPr>
+      <p:pic>
+        <p:nvPicPr>
+          <p:cNvPr id="8" name="Imagem 7"/>
+          <p:cNvPicPr>
+            <a:picLocks noChangeAspect="1"/>
+          </p:cNvPicPr>
+          <p:nvPr/>
+        </p:nvPicPr>
+        <p:blipFill>
+          <a:blip r:embed="rId2"/>
+          <a:stretch>
+            <a:fillRect/>
+          </a:stretch>
+        </p:blipFill>
+        <p:spPr>
+          <a:xfrm>
+            <a:off x="480725" y="2803023"/>
+            <a:ext cx="10609524" cy="2800000"/>
+          </a:xfrm>
+          <a:prstGeom prst="rect">
+            <a:avLst/>
+          </a:prstGeom>
+        </p:spPr>
+      </p:pic>
+      <p:sp>
+        <p:nvSpPr>
+          <p:cNvPr id="2" name="Título 1"/>
+          <p:cNvSpPr>
+            <a:spLocks noGrp="1"/>
+          </p:cNvSpPr>
+          <p:nvPr>
+            <p:ph type="title"/>
+          </p:nvPr>
+        </p:nvSpPr>
+        <p:spPr>
+          <a:xfrm>
+            <a:off x="480725" y="385591"/>
+            <a:ext cx="7914128" cy="685753"/>
+          </a:xfrm>
+        </p:spPr>
+        <p:txBody>
+          <a:bodyPr>
+            <a:normAutofit/>
+          </a:bodyPr>
+          <a:lstStyle/>
+          <a:p>
+            <a:r>
+              <a:rPr lang="pt-BR" sz="3200" dirty="0" smtClean="0">
+                <a:latin typeface="Consolas" panose="020B0609020204030204" pitchFamily="49" charset="0"/>
+              </a:rPr>
+              <a:t>Estrutura de repetição For</a:t>
+            </a:r>
+            <a:endParaRPr lang="pt-BR" sz="3200" dirty="0">
+              <a:latin typeface="Consolas" panose="020B0609020204030204" pitchFamily="49" charset="0"/>
+            </a:endParaRPr>
+          </a:p>
+        </p:txBody>
+      </p:sp>
+      <p:pic>
+        <p:nvPicPr>
+          <p:cNvPr id="4" name="Imagem 3"/>
+          <p:cNvPicPr>
+            <a:picLocks noChangeAspect="1"/>
+          </p:cNvPicPr>
+          <p:nvPr/>
+        </p:nvPicPr>
+        <p:blipFill>
+          <a:blip r:embed="rId3" cstate="print">
+            <a:extLst>
+              <a:ext uri="{28A0092B-C50C-407E-A947-70E740481C1C}">
+                <a14:useLocalDpi xmlns:a14="http://schemas.microsoft.com/office/drawing/2010/main" val="0"/>
+              </a:ext>
+            </a:extLst>
+          </a:blip>
+          <a:stretch>
+            <a:fillRect/>
+          </a:stretch>
+        </p:blipFill>
+        <p:spPr>
+          <a:xfrm>
+            <a:off x="10441211" y="110689"/>
+            <a:ext cx="1750789" cy="2157949"/>
+          </a:xfrm>
+          <a:prstGeom prst="rect">
+            <a:avLst/>
+          </a:prstGeom>
+        </p:spPr>
+      </p:pic>
+      <p:sp>
+        <p:nvSpPr>
+          <p:cNvPr id="16" name="Seta para baixo 15"/>
+          <p:cNvSpPr/>
+          <p:nvPr/>
+        </p:nvSpPr>
+        <p:spPr>
+          <a:xfrm rot="16200000">
+            <a:off x="913219" y="3909362"/>
+            <a:ext cx="309243" cy="442827"/>
+          </a:xfrm>
+          <a:prstGeom prst="downArrow">
+            <a:avLst/>
+          </a:prstGeom>
+          <a:noFill/>
+          <a:ln w="38100">
+            <a:solidFill>
+              <a:schemeClr val="tx1"/>
+            </a:solidFill>
+          </a:ln>
+        </p:spPr>
+        <p:style>
+          <a:lnRef idx="2">
+            <a:schemeClr val="accent1">
+              <a:shade val="50000"/>
+            </a:schemeClr>
+          </a:lnRef>
+          <a:fillRef idx="1">
+            <a:schemeClr val="accent1"/>
+          </a:fillRef>
+          <a:effectRef idx="0">
+            <a:schemeClr val="accent1"/>
+          </a:effectRef>
+          <a:fontRef idx="minor">
+            <a:schemeClr val="lt1"/>
+          </a:fontRef>
+        </p:style>
+        <p:txBody>
+          <a:bodyPr rtlCol="0" anchor="ctr"/>
+          <a:lstStyle/>
+          <a:p>
+            <a:pPr algn="ctr"/>
+            <a:endParaRPr lang="pt-BR"/>
+          </a:p>
+        </p:txBody>
+      </p:sp>
+      <p:sp>
+        <p:nvSpPr>
+          <p:cNvPr id="17" name="CaixaDeTexto 16"/>
+          <p:cNvSpPr txBox="1"/>
+          <p:nvPr/>
+        </p:nvSpPr>
+        <p:spPr>
+          <a:xfrm>
+            <a:off x="7410226" y="1071344"/>
+            <a:ext cx="2046358" cy="1200329"/>
+          </a:xfrm>
+          <a:prstGeom prst="rect">
+            <a:avLst/>
+          </a:prstGeom>
+          <a:noFill/>
+        </p:spPr>
+        <p:txBody>
+          <a:bodyPr wrap="square" rtlCol="0">
+            <a:spAutoFit/>
+          </a:bodyPr>
+          <a:lstStyle/>
+          <a:p>
+            <a:r>
+              <a:rPr lang="pt-BR" sz="2400" b="1" dirty="0" smtClean="0">
+                <a:latin typeface="Consolas" panose="020B0609020204030204" pitchFamily="49" charset="0"/>
+              </a:rPr>
+              <a:t>Incrementa i, i passa valer 4</a:t>
+            </a:r>
+            <a:endParaRPr lang="pt-BR" sz="2400" b="1" dirty="0">
+              <a:latin typeface="Consolas" panose="020B0609020204030204" pitchFamily="49" charset="0"/>
+            </a:endParaRPr>
+          </a:p>
+        </p:txBody>
+      </p:sp>
+      <p:cxnSp>
+        <p:nvCxnSpPr>
+          <p:cNvPr id="18" name="Conector de seta reta 17"/>
+          <p:cNvCxnSpPr/>
+          <p:nvPr/>
+        </p:nvCxnSpPr>
+        <p:spPr>
+          <a:xfrm flipV="1">
+            <a:off x="6337300" y="2120900"/>
+            <a:ext cx="1072925" cy="1855255"/>
+          </a:xfrm>
+          <a:prstGeom prst="straightConnector1">
+            <a:avLst/>
+          </a:prstGeom>
+          <a:ln w="38100">
+            <a:solidFill>
+              <a:schemeClr val="tx1"/>
+            </a:solidFill>
+            <a:tailEnd type="triangle"/>
+          </a:ln>
+        </p:spPr>
+        <p:style>
+          <a:lnRef idx="1">
+            <a:schemeClr val="accent1"/>
+          </a:lnRef>
+          <a:fillRef idx="0">
+            <a:schemeClr val="accent1"/>
+          </a:fillRef>
+          <a:effectRef idx="0">
+            <a:schemeClr val="accent1"/>
+          </a:effectRef>
+          <a:fontRef idx="minor">
+            <a:schemeClr val="tx1"/>
+          </a:fontRef>
+        </p:style>
+      </p:cxnSp>
+    </p:spTree>
+    <p:extLst>
+      <p:ext uri="{BB962C8B-B14F-4D97-AF65-F5344CB8AC3E}">
+        <p14:creationId xmlns:p14="http://schemas.microsoft.com/office/powerpoint/2010/main" val="595043859"/>
+      </p:ext>
+    </p:extLst>
+  </p:cSld>
+  <p:clrMapOvr>
+    <a:masterClrMapping/>
+  </p:clrMapOvr>
+  <p:timing>
+    <p:tnLst>
+      <p:par>
+        <p:cTn id="1" dur="indefinite" restart="never" nodeType="tmRoot"/>
+      </p:par>
+    </p:tnLst>
+  </p:timing>
+</p:sld>
+</file>
+
+<file path=ppt/slides/slide54.xml><?xml version="1.0" encoding="utf-8"?>
+<p:sld xmlns:a="http://schemas.openxmlformats.org/drawingml/2006/main" xmlns:r="http://schemas.openxmlformats.org/officeDocument/2006/relationships" xmlns:p="http://schemas.openxmlformats.org/presentationml/2006/main">
+  <p:cSld>
+    <p:spTree>
+      <p:nvGrpSpPr>
+        <p:cNvPr id="1" name=""/>
+        <p:cNvGrpSpPr/>
+        <p:nvPr/>
+      </p:nvGrpSpPr>
+      <p:grpSpPr>
+        <a:xfrm>
+          <a:off x="0" y="0"/>
+          <a:ext cx="0" cy="0"/>
+          <a:chOff x="0" y="0"/>
+          <a:chExt cx="0" cy="0"/>
+        </a:xfrm>
+      </p:grpSpPr>
+      <p:pic>
+        <p:nvPicPr>
+          <p:cNvPr id="8" name="Imagem 7"/>
+          <p:cNvPicPr>
+            <a:picLocks noChangeAspect="1"/>
+          </p:cNvPicPr>
+          <p:nvPr/>
+        </p:nvPicPr>
+        <p:blipFill>
+          <a:blip r:embed="rId2"/>
+          <a:stretch>
+            <a:fillRect/>
+          </a:stretch>
+        </p:blipFill>
+        <p:spPr>
+          <a:xfrm>
+            <a:off x="480725" y="2803023"/>
+            <a:ext cx="10609524" cy="2800000"/>
+          </a:xfrm>
+          <a:prstGeom prst="rect">
+            <a:avLst/>
+          </a:prstGeom>
+        </p:spPr>
+      </p:pic>
+      <p:sp>
+        <p:nvSpPr>
+          <p:cNvPr id="2" name="Título 1"/>
+          <p:cNvSpPr>
+            <a:spLocks noGrp="1"/>
+          </p:cNvSpPr>
+          <p:nvPr>
+            <p:ph type="title"/>
+          </p:nvPr>
+        </p:nvSpPr>
+        <p:spPr>
+          <a:xfrm>
+            <a:off x="480725" y="385591"/>
+            <a:ext cx="7914128" cy="685753"/>
+          </a:xfrm>
+        </p:spPr>
+        <p:txBody>
+          <a:bodyPr>
+            <a:normAutofit/>
+          </a:bodyPr>
+          <a:lstStyle/>
+          <a:p>
+            <a:r>
+              <a:rPr lang="pt-BR" sz="3200" dirty="0" smtClean="0">
+                <a:latin typeface="Consolas" panose="020B0609020204030204" pitchFamily="49" charset="0"/>
+              </a:rPr>
+              <a:t>Estrutura de repetição For</a:t>
+            </a:r>
+            <a:endParaRPr lang="pt-BR" sz="3200" dirty="0">
+              <a:latin typeface="Consolas" panose="020B0609020204030204" pitchFamily="49" charset="0"/>
+            </a:endParaRPr>
+          </a:p>
+        </p:txBody>
+      </p:sp>
+      <p:pic>
+        <p:nvPicPr>
+          <p:cNvPr id="4" name="Imagem 3"/>
+          <p:cNvPicPr>
+            <a:picLocks noChangeAspect="1"/>
+          </p:cNvPicPr>
+          <p:nvPr/>
+        </p:nvPicPr>
+        <p:blipFill>
+          <a:blip r:embed="rId3" cstate="print">
+            <a:extLst>
+              <a:ext uri="{28A0092B-C50C-407E-A947-70E740481C1C}">
+                <a14:useLocalDpi xmlns:a14="http://schemas.microsoft.com/office/drawing/2010/main" val="0"/>
+              </a:ext>
+            </a:extLst>
+          </a:blip>
+          <a:stretch>
+            <a:fillRect/>
+          </a:stretch>
+        </p:blipFill>
+        <p:spPr>
+          <a:xfrm>
+            <a:off x="10441211" y="110689"/>
+            <a:ext cx="1750789" cy="2157949"/>
+          </a:xfrm>
+          <a:prstGeom prst="rect">
+            <a:avLst/>
+          </a:prstGeom>
+        </p:spPr>
+      </p:pic>
+      <p:sp>
+        <p:nvSpPr>
+          <p:cNvPr id="5" name="CaixaDeTexto 4"/>
+          <p:cNvSpPr txBox="1"/>
+          <p:nvPr/>
+        </p:nvSpPr>
+        <p:spPr>
+          <a:xfrm>
+            <a:off x="1458316" y="1417862"/>
+            <a:ext cx="2540036" cy="461665"/>
+          </a:xfrm>
+          <a:prstGeom prst="rect">
+            <a:avLst/>
+          </a:prstGeom>
+          <a:noFill/>
+        </p:spPr>
+        <p:txBody>
+          <a:bodyPr wrap="square" rtlCol="0">
+            <a:spAutoFit/>
+          </a:bodyPr>
+          <a:lstStyle/>
+          <a:p>
+            <a:r>
+              <a:rPr lang="pt-BR" sz="2400" b="1" dirty="0" smtClean="0">
+                <a:latin typeface="Consolas" panose="020B0609020204030204" pitchFamily="49" charset="0"/>
+              </a:rPr>
+              <a:t>Agora i é 4</a:t>
+            </a:r>
+            <a:endParaRPr lang="pt-BR" sz="2400" b="1" dirty="0">
+              <a:latin typeface="Consolas" panose="020B0609020204030204" pitchFamily="49" charset="0"/>
+            </a:endParaRPr>
+          </a:p>
+        </p:txBody>
+      </p:sp>
+      <p:sp>
+        <p:nvSpPr>
+          <p:cNvPr id="16" name="Seta para baixo 15"/>
+          <p:cNvSpPr/>
+          <p:nvPr/>
+        </p:nvSpPr>
+        <p:spPr>
+          <a:xfrm rot="16200000">
+            <a:off x="913219" y="3909362"/>
+            <a:ext cx="309243" cy="442827"/>
+          </a:xfrm>
+          <a:prstGeom prst="downArrow">
+            <a:avLst/>
+          </a:prstGeom>
+          <a:noFill/>
+          <a:ln w="38100">
+            <a:solidFill>
+              <a:schemeClr val="tx1"/>
+            </a:solidFill>
+          </a:ln>
+        </p:spPr>
+        <p:style>
+          <a:lnRef idx="2">
+            <a:schemeClr val="accent1">
+              <a:shade val="50000"/>
+            </a:schemeClr>
+          </a:lnRef>
+          <a:fillRef idx="1">
+            <a:schemeClr val="accent1"/>
+          </a:fillRef>
+          <a:effectRef idx="0">
+            <a:schemeClr val="accent1"/>
+          </a:effectRef>
+          <a:fontRef idx="minor">
+            <a:schemeClr val="lt1"/>
+          </a:fontRef>
+        </p:style>
+        <p:txBody>
+          <a:bodyPr rtlCol="0" anchor="ctr"/>
+          <a:lstStyle/>
+          <a:p>
+            <a:pPr algn="ctr"/>
+            <a:endParaRPr lang="pt-BR"/>
+          </a:p>
+        </p:txBody>
+      </p:sp>
+      <p:sp>
+        <p:nvSpPr>
+          <p:cNvPr id="17" name="CaixaDeTexto 16"/>
+          <p:cNvSpPr txBox="1"/>
+          <p:nvPr/>
+        </p:nvSpPr>
+        <p:spPr>
+          <a:xfrm>
+            <a:off x="4768625" y="1417863"/>
+            <a:ext cx="4375375" cy="461665"/>
+          </a:xfrm>
+          <a:prstGeom prst="rect">
+            <a:avLst/>
+          </a:prstGeom>
+          <a:noFill/>
+        </p:spPr>
+        <p:txBody>
+          <a:bodyPr wrap="square" rtlCol="0">
+            <a:spAutoFit/>
+          </a:bodyPr>
+          <a:lstStyle/>
+          <a:p>
+            <a:r>
+              <a:rPr lang="pt-BR" sz="2400" b="1" dirty="0" smtClean="0">
+                <a:latin typeface="Consolas" panose="020B0609020204030204" pitchFamily="49" charset="0"/>
+              </a:rPr>
+              <a:t>Testa se i é menor que 4</a:t>
+            </a:r>
+            <a:endParaRPr lang="pt-BR" sz="2400" b="1" dirty="0">
+              <a:latin typeface="Consolas" panose="020B0609020204030204" pitchFamily="49" charset="0"/>
+            </a:endParaRPr>
+          </a:p>
+        </p:txBody>
+      </p:sp>
+      <p:cxnSp>
+        <p:nvCxnSpPr>
+          <p:cNvPr id="18" name="Conector de seta reta 17"/>
+          <p:cNvCxnSpPr/>
+          <p:nvPr/>
+        </p:nvCxnSpPr>
+        <p:spPr>
+          <a:xfrm flipV="1">
+            <a:off x="5216396" y="1896455"/>
+            <a:ext cx="1144233" cy="1788628"/>
+          </a:xfrm>
+          <a:prstGeom prst="straightConnector1">
+            <a:avLst/>
+          </a:prstGeom>
+          <a:ln w="38100">
+            <a:solidFill>
+              <a:schemeClr val="tx1"/>
+            </a:solidFill>
+            <a:tailEnd type="triangle"/>
+          </a:ln>
+        </p:spPr>
+        <p:style>
+          <a:lnRef idx="1">
+            <a:schemeClr val="accent1"/>
+          </a:lnRef>
+          <a:fillRef idx="0">
+            <a:schemeClr val="accent1"/>
+          </a:fillRef>
+          <a:effectRef idx="0">
+            <a:schemeClr val="accent1"/>
+          </a:effectRef>
+          <a:fontRef idx="minor">
+            <a:schemeClr val="tx1"/>
+          </a:fontRef>
+        </p:style>
+      </p:cxnSp>
+      <p:sp>
+        <p:nvSpPr>
+          <p:cNvPr id="22" name="CaixaDeTexto 21"/>
+          <p:cNvSpPr txBox="1"/>
+          <p:nvPr/>
+        </p:nvSpPr>
+        <p:spPr>
+          <a:xfrm>
+            <a:off x="7086600" y="2037805"/>
+            <a:ext cx="1390571" cy="461665"/>
+          </a:xfrm>
+          <a:prstGeom prst="rect">
+            <a:avLst/>
+          </a:prstGeom>
+          <a:noFill/>
+        </p:spPr>
+        <p:txBody>
+          <a:bodyPr wrap="square" rtlCol="0">
+            <a:spAutoFit/>
+          </a:bodyPr>
+          <a:lstStyle/>
+          <a:p>
+            <a:r>
+              <a:rPr lang="pt-BR" sz="2400" b="1" dirty="0" smtClean="0">
+                <a:solidFill>
+                  <a:srgbClr val="FF0000"/>
+                </a:solidFill>
+                <a:latin typeface="Consolas" panose="020B0609020204030204" pitchFamily="49" charset="0"/>
+              </a:rPr>
+              <a:t>false</a:t>
+            </a:r>
+            <a:endParaRPr lang="pt-BR" sz="2400" b="1" dirty="0">
+              <a:solidFill>
+                <a:srgbClr val="FF0000"/>
+              </a:solidFill>
+              <a:latin typeface="Consolas" panose="020B0609020204030204" pitchFamily="49" charset="0"/>
+            </a:endParaRPr>
+          </a:p>
+        </p:txBody>
+      </p:sp>
+      <p:cxnSp>
+        <p:nvCxnSpPr>
+          <p:cNvPr id="23" name="Conector de seta reta 22"/>
+          <p:cNvCxnSpPr/>
+          <p:nvPr/>
+        </p:nvCxnSpPr>
+        <p:spPr>
+          <a:xfrm flipV="1">
+            <a:off x="5448300" y="2329104"/>
+            <a:ext cx="1638300" cy="1355979"/>
+          </a:xfrm>
+          <a:prstGeom prst="straightConnector1">
+            <a:avLst/>
+          </a:prstGeom>
+          <a:ln w="38100">
+            <a:solidFill>
+              <a:srgbClr val="FF0000"/>
+            </a:solidFill>
+            <a:tailEnd type="triangle"/>
+          </a:ln>
+        </p:spPr>
+        <p:style>
+          <a:lnRef idx="1">
+            <a:schemeClr val="accent1"/>
+          </a:lnRef>
+          <a:fillRef idx="0">
+            <a:schemeClr val="accent1"/>
+          </a:fillRef>
+          <a:effectRef idx="0">
+            <a:schemeClr val="accent1"/>
+          </a:effectRef>
+          <a:fontRef idx="minor">
+            <a:schemeClr val="tx1"/>
+          </a:fontRef>
+        </p:style>
+      </p:cxnSp>
+      <p:cxnSp>
+        <p:nvCxnSpPr>
+          <p:cNvPr id="13" name="Conector de seta reta 12"/>
+          <p:cNvCxnSpPr/>
+          <p:nvPr/>
+        </p:nvCxnSpPr>
+        <p:spPr>
+          <a:xfrm>
+            <a:off x="3547903" y="1671750"/>
+            <a:ext cx="1176420" cy="0"/>
+          </a:xfrm>
+          <a:prstGeom prst="straightConnector1">
+            <a:avLst/>
+          </a:prstGeom>
+          <a:ln w="38100">
+            <a:solidFill>
+              <a:schemeClr val="tx1"/>
+            </a:solidFill>
+            <a:tailEnd type="triangle"/>
+          </a:ln>
+        </p:spPr>
+        <p:style>
+          <a:lnRef idx="1">
+            <a:schemeClr val="accent1"/>
+          </a:lnRef>
+          <a:fillRef idx="0">
+            <a:schemeClr val="accent1"/>
+          </a:fillRef>
+          <a:effectRef idx="0">
+            <a:schemeClr val="accent1"/>
+          </a:effectRef>
+          <a:fontRef idx="minor">
+            <a:schemeClr val="tx1"/>
+          </a:fontRef>
+        </p:style>
+      </p:cxnSp>
+      <p:sp>
+        <p:nvSpPr>
+          <p:cNvPr id="12" name="CaixaDeTexto 11"/>
+          <p:cNvSpPr txBox="1"/>
+          <p:nvPr/>
+        </p:nvSpPr>
+        <p:spPr>
+          <a:xfrm>
+            <a:off x="9141913" y="1974305"/>
+            <a:ext cx="1602287" cy="646331"/>
+          </a:xfrm>
+          <a:prstGeom prst="rect">
+            <a:avLst/>
+          </a:prstGeom>
+          <a:noFill/>
+        </p:spPr>
+        <p:txBody>
+          <a:bodyPr wrap="square" rtlCol="0">
+            <a:spAutoFit/>
+          </a:bodyPr>
+          <a:lstStyle/>
+          <a:p>
+            <a:r>
+              <a:rPr lang="pt-BR" b="1" dirty="0" smtClean="0">
+                <a:solidFill>
+                  <a:srgbClr val="FF0000"/>
+                </a:solidFill>
+                <a:latin typeface="Consolas" panose="020B0609020204030204" pitchFamily="49" charset="0"/>
+              </a:rPr>
+              <a:t>Finaliza a repetição</a:t>
+            </a:r>
+            <a:endParaRPr lang="pt-BR" b="1" dirty="0">
+              <a:solidFill>
+                <a:srgbClr val="FF0000"/>
+              </a:solidFill>
+              <a:latin typeface="Consolas" panose="020B0609020204030204" pitchFamily="49" charset="0"/>
+            </a:endParaRPr>
+          </a:p>
+        </p:txBody>
+      </p:sp>
+      <p:cxnSp>
+        <p:nvCxnSpPr>
+          <p:cNvPr id="14" name="Conector de seta reta 13"/>
+          <p:cNvCxnSpPr/>
+          <p:nvPr/>
+        </p:nvCxnSpPr>
+        <p:spPr>
+          <a:xfrm>
+            <a:off x="8176570" y="2303704"/>
+            <a:ext cx="965343" cy="1"/>
+          </a:xfrm>
+          <a:prstGeom prst="straightConnector1">
+            <a:avLst/>
+          </a:prstGeom>
+          <a:ln w="38100">
+            <a:solidFill>
+              <a:srgbClr val="FF0000"/>
+            </a:solidFill>
+            <a:tailEnd type="triangle"/>
+          </a:ln>
+        </p:spPr>
+        <p:style>
+          <a:lnRef idx="1">
+            <a:schemeClr val="accent1"/>
+          </a:lnRef>
+          <a:fillRef idx="0">
+            <a:schemeClr val="accent1"/>
+          </a:fillRef>
+          <a:effectRef idx="0">
+            <a:schemeClr val="accent1"/>
+          </a:effectRef>
+          <a:fontRef idx="minor">
+            <a:schemeClr val="tx1"/>
+          </a:fontRef>
+        </p:style>
+      </p:cxnSp>
+    </p:spTree>
+    <p:extLst>
+      <p:ext uri="{BB962C8B-B14F-4D97-AF65-F5344CB8AC3E}">
+        <p14:creationId xmlns:p14="http://schemas.microsoft.com/office/powerpoint/2010/main" val="2727074487"/>
+      </p:ext>
+    </p:extLst>
+  </p:cSld>
+  <p:clrMapOvr>
+    <a:masterClrMapping/>
+  </p:clrMapOvr>
+  <p:timing>
+    <p:tnLst>
+      <p:par>
+        <p:cTn id="1" dur="indefinite" restart="never" nodeType="tmRoot">
+          <p:childTnLst>
+            <p:seq concurrent="1" nextAc="seek">
+              <p:cTn id="2" dur="indefinite" nodeType="mainSeq">
+                <p:childTnLst>
+                  <p:par>
+                    <p:cTn id="3" fill="hold">
+                      <p:stCondLst>
+                        <p:cond delay="indefinite"/>
+                      </p:stCondLst>
+                      <p:childTnLst>
+                        <p:par>
+                          <p:cTn id="4" fill="hold">
+                            <p:stCondLst>
+                              <p:cond delay="0"/>
+                            </p:stCondLst>
+                            <p:childTnLst>
+                              <p:par>
+                                <p:cTn id="5" presetID="10" presetClass="entr" presetSubtype="0" fill="hold" grpId="0" nodeType="clickEffect">
+                                  <p:stCondLst>
+                                    <p:cond delay="0"/>
+                                  </p:stCondLst>
+                                  <p:childTnLst>
+                                    <p:set>
+                                      <p:cBhvr>
+                                        <p:cTn id="6" dur="1" fill="hold">
+                                          <p:stCondLst>
+                                            <p:cond delay="0"/>
+                                          </p:stCondLst>
+                                        </p:cTn>
+                                        <p:tgtEl>
+                                          <p:spTgt spid="22"/>
+                                        </p:tgtEl>
+                                        <p:attrNameLst>
+                                          <p:attrName>style.visibility</p:attrName>
+                                        </p:attrNameLst>
+                                      </p:cBhvr>
+                                      <p:to>
+                                        <p:strVal val="visible"/>
+                                      </p:to>
+                                    </p:set>
+                                    <p:animEffect transition="in" filter="fade">
+                                      <p:cBhvr>
+                                        <p:cTn id="7" dur="500"/>
+                                        <p:tgtEl>
+                                          <p:spTgt spid="22"/>
+                                        </p:tgtEl>
+                                      </p:cBhvr>
+                                    </p:animEffect>
+                                  </p:childTnLst>
+                                </p:cTn>
+                              </p:par>
+                              <p:par>
+                                <p:cTn id="8" presetID="10" presetClass="entr" presetSubtype="0" fill="hold" nodeType="withEffect">
+                                  <p:stCondLst>
+                                    <p:cond delay="0"/>
+                                  </p:stCondLst>
+                                  <p:childTnLst>
+                                    <p:set>
+                                      <p:cBhvr>
+                                        <p:cTn id="9" dur="1" fill="hold">
+                                          <p:stCondLst>
+                                            <p:cond delay="0"/>
+                                          </p:stCondLst>
+                                        </p:cTn>
+                                        <p:tgtEl>
+                                          <p:spTgt spid="23"/>
+                                        </p:tgtEl>
+                                        <p:attrNameLst>
+                                          <p:attrName>style.visibility</p:attrName>
+                                        </p:attrNameLst>
+                                      </p:cBhvr>
+                                      <p:to>
+                                        <p:strVal val="visible"/>
+                                      </p:to>
+                                    </p:set>
+                                    <p:animEffect transition="in" filter="fade">
+                                      <p:cBhvr>
+                                        <p:cTn id="10" dur="500"/>
+                                        <p:tgtEl>
+                                          <p:spTgt spid="23"/>
+                                        </p:tgtEl>
+                                      </p:cBhvr>
+                                    </p:animEffect>
+                                  </p:childTnLst>
+                                </p:cTn>
+                              </p:par>
+                            </p:childTnLst>
+                          </p:cTn>
+                        </p:par>
+                      </p:childTnLst>
+                    </p:cTn>
+                  </p:par>
+                  <p:par>
+                    <p:cTn id="11" fill="hold">
+                      <p:stCondLst>
+                        <p:cond delay="indefinite"/>
+                      </p:stCondLst>
+                      <p:childTnLst>
+                        <p:par>
+                          <p:cTn id="12" fill="hold">
+                            <p:stCondLst>
+                              <p:cond delay="0"/>
+                            </p:stCondLst>
+                            <p:childTnLst>
+                              <p:par>
+                                <p:cTn id="13" presetID="10" presetClass="entr" presetSubtype="0" fill="hold" grpId="0" nodeType="clickEffect">
+                                  <p:stCondLst>
+                                    <p:cond delay="0"/>
+                                  </p:stCondLst>
+                                  <p:childTnLst>
+                                    <p:set>
+                                      <p:cBhvr>
+                                        <p:cTn id="14" dur="1" fill="hold">
+                                          <p:stCondLst>
+                                            <p:cond delay="0"/>
+                                          </p:stCondLst>
+                                        </p:cTn>
+                                        <p:tgtEl>
+                                          <p:spTgt spid="12"/>
+                                        </p:tgtEl>
+                                        <p:attrNameLst>
+                                          <p:attrName>style.visibility</p:attrName>
+                                        </p:attrNameLst>
+                                      </p:cBhvr>
+                                      <p:to>
+                                        <p:strVal val="visible"/>
+                                      </p:to>
+                                    </p:set>
+                                    <p:animEffect transition="in" filter="fade">
+                                      <p:cBhvr>
+                                        <p:cTn id="15" dur="500"/>
+                                        <p:tgtEl>
+                                          <p:spTgt spid="12"/>
+                                        </p:tgtEl>
+                                      </p:cBhvr>
+                                    </p:animEffect>
+                                  </p:childTnLst>
+                                </p:cTn>
+                              </p:par>
+                              <p:par>
+                                <p:cTn id="16" presetID="10" presetClass="entr" presetSubtype="0" fill="hold" nodeType="withEffect">
+                                  <p:stCondLst>
+                                    <p:cond delay="0"/>
+                                  </p:stCondLst>
+                                  <p:childTnLst>
+                                    <p:set>
+                                      <p:cBhvr>
+                                        <p:cTn id="17" dur="1" fill="hold">
+                                          <p:stCondLst>
+                                            <p:cond delay="0"/>
+                                          </p:stCondLst>
+                                        </p:cTn>
+                                        <p:tgtEl>
+                                          <p:spTgt spid="14"/>
+                                        </p:tgtEl>
+                                        <p:attrNameLst>
+                                          <p:attrName>style.visibility</p:attrName>
+                                        </p:attrNameLst>
+                                      </p:cBhvr>
+                                      <p:to>
+                                        <p:strVal val="visible"/>
+                                      </p:to>
+                                    </p:set>
+                                    <p:animEffect transition="in" filter="fade">
+                                      <p:cBhvr>
+                                        <p:cTn id="18" dur="500"/>
+                                        <p:tgtEl>
+                                          <p:spTgt spid="14"/>
+                                        </p:tgtEl>
+                                      </p:cBhvr>
+                                    </p:animEffect>
+                                  </p:childTnLst>
+                                </p:cTn>
+                              </p:par>
+                            </p:childTnLst>
+                          </p:cTn>
+                        </p:par>
+                      </p:childTnLst>
+                    </p:cTn>
+                  </p:par>
+                </p:childTnLst>
+              </p:cTn>
+              <p:prevCondLst>
+                <p:cond evt="onPrev" delay="0">
+                  <p:tgtEl>
+                    <p:sldTgt/>
+                  </p:tgtEl>
+                </p:cond>
+              </p:prevCondLst>
+              <p:nextCondLst>
+                <p:cond evt="onNext" delay="0">
+                  <p:tgtEl>
+                    <p:sldTgt/>
+                  </p:tgtEl>
+                </p:cond>
+              </p:nextCondLst>
+            </p:seq>
+          </p:childTnLst>
+        </p:cTn>
+      </p:par>
+    </p:tnLst>
+    <p:bldLst>
+      <p:bldP spid="22" grpId="0"/>
+      <p:bldP spid="12" grpId="0"/>
+    </p:bldLst>
+  </p:timing>
+</p:sld>
+</file>
+
+<file path=ppt/slides/slide55.xml><?xml version="1.0" encoding="utf-8"?>
+<p:sld xmlns:a="http://schemas.openxmlformats.org/drawingml/2006/main" xmlns:r="http://schemas.openxmlformats.org/officeDocument/2006/relationships" xmlns:p="http://schemas.openxmlformats.org/presentationml/2006/main">
+  <p:cSld>
+    <p:spTree>
+      <p:nvGrpSpPr>
+        <p:cNvPr id="1" name=""/>
+        <p:cNvGrpSpPr/>
+        <p:nvPr/>
+      </p:nvGrpSpPr>
+      <p:grpSpPr>
+        <a:xfrm>
+          <a:off x="0" y="0"/>
+          <a:ext cx="0" cy="0"/>
+          <a:chOff x="0" y="0"/>
+          <a:chExt cx="0" cy="0"/>
+        </a:xfrm>
+      </p:grpSpPr>
+      <p:sp>
+        <p:nvSpPr>
+          <p:cNvPr id="2" name="Título 1"/>
+          <p:cNvSpPr>
+            <a:spLocks noGrp="1"/>
+          </p:cNvSpPr>
+          <p:nvPr>
+            <p:ph type="title"/>
+          </p:nvPr>
+        </p:nvSpPr>
+        <p:spPr>
+          <a:xfrm>
+            <a:off x="480725" y="385591"/>
+            <a:ext cx="7914128" cy="685753"/>
+          </a:xfrm>
+        </p:spPr>
+        <p:txBody>
+          <a:bodyPr>
+            <a:normAutofit/>
+          </a:bodyPr>
+          <a:lstStyle/>
+          <a:p>
+            <a:r>
+              <a:rPr lang="pt-BR" sz="3200" dirty="0" smtClean="0">
+                <a:latin typeface="Consolas" panose="020B0609020204030204" pitchFamily="49" charset="0"/>
+              </a:rPr>
+              <a:t>Funções</a:t>
+            </a:r>
+            <a:endParaRPr lang="pt-BR" sz="3200" dirty="0">
+              <a:latin typeface="Consolas" panose="020B0609020204030204" pitchFamily="49" charset="0"/>
+            </a:endParaRPr>
+          </a:p>
+        </p:txBody>
+      </p:sp>
+      <p:pic>
+        <p:nvPicPr>
+          <p:cNvPr id="4" name="Imagem 3"/>
+          <p:cNvPicPr>
+            <a:picLocks noChangeAspect="1"/>
+          </p:cNvPicPr>
+          <p:nvPr/>
+        </p:nvPicPr>
+        <p:blipFill>
+          <a:blip r:embed="rId2" cstate="print">
+            <a:extLst>
+              <a:ext uri="{28A0092B-C50C-407E-A947-70E740481C1C}">
+                <a14:useLocalDpi xmlns:a14="http://schemas.microsoft.com/office/drawing/2010/main" val="0"/>
+              </a:ext>
+            </a:extLst>
+          </a:blip>
+          <a:stretch>
+            <a:fillRect/>
+          </a:stretch>
+        </p:blipFill>
+        <p:spPr>
+          <a:xfrm>
+            <a:off x="10441211" y="110689"/>
+            <a:ext cx="1750789" cy="2157949"/>
+          </a:xfrm>
+          <a:prstGeom prst="rect">
+            <a:avLst/>
+          </a:prstGeom>
+        </p:spPr>
+      </p:pic>
+      <p:sp>
+        <p:nvSpPr>
+          <p:cNvPr id="5" name="CaixaDeTexto 4"/>
+          <p:cNvSpPr txBox="1"/>
+          <p:nvPr/>
+        </p:nvSpPr>
+        <p:spPr>
+          <a:xfrm>
+            <a:off x="480725" y="1112294"/>
+            <a:ext cx="2540036" cy="461665"/>
+          </a:xfrm>
+          <a:prstGeom prst="rect">
+            <a:avLst/>
+          </a:prstGeom>
+          <a:noFill/>
+        </p:spPr>
+        <p:txBody>
+          <a:bodyPr wrap="square" rtlCol="0">
+            <a:spAutoFit/>
+          </a:bodyPr>
+          <a:lstStyle/>
+          <a:p>
+            <a:r>
+              <a:rPr lang="pt-BR" sz="2400" b="1" dirty="0" smtClean="0">
+                <a:latin typeface="Consolas" panose="020B0609020204030204" pitchFamily="49" charset="0"/>
+              </a:rPr>
+              <a:t>Explicar</a:t>
+            </a:r>
+            <a:endParaRPr lang="pt-BR" sz="2400" b="1" dirty="0">
+              <a:latin typeface="Consolas" panose="020B0609020204030204" pitchFamily="49" charset="0"/>
+            </a:endParaRPr>
+          </a:p>
+        </p:txBody>
+      </p:sp>
+    </p:spTree>
+    <p:extLst>
+      <p:ext uri="{BB962C8B-B14F-4D97-AF65-F5344CB8AC3E}">
+        <p14:creationId xmlns:p14="http://schemas.microsoft.com/office/powerpoint/2010/main" val="3777526105"/>
+      </p:ext>
+    </p:extLst>
+  </p:cSld>
+  <p:clrMapOvr>
+    <a:masterClrMapping/>
+  </p:clrMapOvr>
+  <p:timing>
+    <p:tnLst>
+      <p:par>
+        <p:cTn id="1" dur="indefinite" restart="never" nodeType="tmRoot"/>
+      </p:par>
+    </p:tnLst>
   </p:timing>
 </p:sld>
 </file>

</xml_diff>